<commit_message>
v30, so far, so good
</commit_message>
<xml_diff>
--- a/gui/manual/manual.pptx
+++ b/gui/manual/manual.pptx
@@ -10,6 +10,8 @@
     <p:sldId id="259" r:id="rId4"/>
     <p:sldId id="260" r:id="rId5"/>
     <p:sldId id="261" r:id="rId6"/>
+    <p:sldId id="265" r:id="rId7"/>
+    <p:sldId id="263" r:id="rId8"/>
   </p:sldIdLst>
   <p:sldSz cx="12192000" cy="6858000"/>
   <p:notesSz cx="6858000" cy="9144000"/>
@@ -108,6 +110,11 @@
       </a:defRPr>
     </a:lvl9pPr>
   </p:defaultTextStyle>
+  <p:extLst>
+    <p:ext uri="{EFAFB233-063F-42B5-8137-9DF3F51BA10A}">
+      <p15:sldGuideLst xmlns:p15="http://schemas.microsoft.com/office/powerpoint/2012/main"/>
+    </p:ext>
+  </p:extLst>
 </p:presentation>
 </file>
 
@@ -1008,7 +1015,9 @@
         <a:lstStyle/>
         <a:p>
           <a:r>
-            <a:rPr lang="zh-CN" altLang="en-US" sz="3600" dirty="0"/>
+            <a:rPr lang="zh-CN" altLang="en-US" sz="3600" dirty="0">
+              <a:latin typeface="+mn-lt"/>
+            </a:rPr>
             <a:t>数据载入</a:t>
           </a:r>
         </a:p>
@@ -1080,7 +1089,9 @@
         <a:lstStyle/>
         <a:p>
           <a:r>
-            <a:rPr lang="zh-CN" altLang="en-US" sz="3600" dirty="0"/>
+            <a:rPr lang="zh-CN" altLang="en-US" sz="3600" dirty="0">
+              <a:latin typeface="+mn-lt"/>
+            </a:rPr>
             <a:t>数据预处理</a:t>
           </a:r>
         </a:p>
@@ -1116,7 +1127,9 @@
         <a:lstStyle/>
         <a:p>
           <a:r>
-            <a:rPr lang="zh-CN" altLang="en-US" sz="3600" dirty="0"/>
+            <a:rPr lang="zh-CN" altLang="en-US" sz="3600" dirty="0">
+              <a:latin typeface="+mn-lt"/>
+            </a:rPr>
             <a:t>统计分析</a:t>
           </a:r>
         </a:p>
@@ -1328,6 +1341,202 @@
         </a:p>
       </dgm:t>
     </dgm:pt>
+    <dgm:pt modelId="{F94FE719-7531-4713-8AF1-C68C94FD57A7}">
+      <dgm:prSet phldrT="[Text]" custT="1"/>
+      <dgm:spPr/>
+      <dgm:t>
+        <a:bodyPr/>
+        <a:lstStyle/>
+        <a:p>
+          <a:pPr marL="0" lvl="0" indent="0" algn="ctr" defTabSz="1066800">
+            <a:lnSpc>
+              <a:spcPct val="90000"/>
+            </a:lnSpc>
+            <a:spcBef>
+              <a:spcPct val="0"/>
+            </a:spcBef>
+            <a:spcAft>
+              <a:spcPct val="35000"/>
+            </a:spcAft>
+            <a:buNone/>
+          </a:pPr>
+          <a:r>
+            <a:rPr lang="zh-CN" altLang="en-US" sz="3600" kern="1200" dirty="0">
+              <a:solidFill>
+                <a:prstClr val="black">
+                  <a:hueOff val="0"/>
+                  <a:satOff val="0"/>
+                  <a:lumOff val="0"/>
+                  <a:alphaOff val="0"/>
+                </a:prstClr>
+              </a:solidFill>
+              <a:latin typeface="+mn-lt"/>
+              <a:ea typeface="等线" panose="02010600030101010101" pitchFamily="2" charset="-122"/>
+              <a:cs typeface="+mn-cs"/>
+            </a:rPr>
+            <a:t>结果展示</a:t>
+          </a:r>
+        </a:p>
+      </dgm:t>
+    </dgm:pt>
+    <dgm:pt modelId="{DC31F5BD-AE59-41CD-817B-99449597D3F0}" type="parTrans" cxnId="{2A759A9A-E342-45E3-8F96-AB5A8C4F056A}">
+      <dgm:prSet/>
+      <dgm:spPr/>
+      <dgm:t>
+        <a:bodyPr/>
+        <a:lstStyle/>
+        <a:p>
+          <a:endParaRPr lang="zh-CN" altLang="en-US"/>
+        </a:p>
+      </dgm:t>
+    </dgm:pt>
+    <dgm:pt modelId="{F139C07A-C0DF-45F7-8865-822F4B19F863}" type="sibTrans" cxnId="{2A759A9A-E342-45E3-8F96-AB5A8C4F056A}">
+      <dgm:prSet/>
+      <dgm:spPr/>
+      <dgm:t>
+        <a:bodyPr/>
+        <a:lstStyle/>
+        <a:p>
+          <a:endParaRPr lang="zh-CN" altLang="en-US"/>
+        </a:p>
+      </dgm:t>
+    </dgm:pt>
+    <dgm:pt modelId="{F9E5340C-038C-477B-870E-6127858D6470}">
+      <dgm:prSet phldrT="[Text]" custT="1"/>
+      <dgm:spPr/>
+      <dgm:t>
+        <a:bodyPr/>
+        <a:lstStyle/>
+        <a:p>
+          <a:pPr marL="0" lvl="0" indent="0" algn="ctr" defTabSz="1066800">
+            <a:lnSpc>
+              <a:spcPct val="90000"/>
+            </a:lnSpc>
+            <a:spcBef>
+              <a:spcPct val="0"/>
+            </a:spcBef>
+            <a:spcAft>
+              <a:spcPct val="35000"/>
+            </a:spcAft>
+            <a:buNone/>
+          </a:pPr>
+          <a:r>
+            <a:rPr lang="en-US" altLang="zh-CN" sz="2400" kern="1200" dirty="0">
+              <a:solidFill>
+                <a:prstClr val="black">
+                  <a:hueOff val="0"/>
+                  <a:satOff val="0"/>
+                  <a:lumOff val="0"/>
+                  <a:alphaOff val="0"/>
+                </a:prstClr>
+              </a:solidFill>
+              <a:latin typeface="等线" panose="020F0502020204030204"/>
+              <a:ea typeface="等线" panose="02010600030101010101" pitchFamily="2" charset="-122"/>
+              <a:cs typeface="+mn-cs"/>
+            </a:rPr>
+            <a:t>3D</a:t>
+          </a:r>
+          <a:r>
+            <a:rPr lang="zh-CN" altLang="en-US" sz="2400" kern="1200" dirty="0">
+              <a:solidFill>
+                <a:prstClr val="black">
+                  <a:hueOff val="0"/>
+                  <a:satOff val="0"/>
+                  <a:lumOff val="0"/>
+                  <a:alphaOff val="0"/>
+                </a:prstClr>
+              </a:solidFill>
+              <a:latin typeface="等线" panose="020F0502020204030204"/>
+              <a:ea typeface="等线" panose="02010600030101010101" pitchFamily="2" charset="-122"/>
+              <a:cs typeface="+mn-cs"/>
+            </a:rPr>
+            <a:t>展示</a:t>
+          </a:r>
+        </a:p>
+      </dgm:t>
+    </dgm:pt>
+    <dgm:pt modelId="{406C2359-CF31-415B-B390-06C98B76A688}" type="parTrans" cxnId="{28509449-6362-444F-8FEF-93E816F56080}">
+      <dgm:prSet/>
+      <dgm:spPr/>
+      <dgm:t>
+        <a:bodyPr/>
+        <a:lstStyle/>
+        <a:p>
+          <a:endParaRPr lang="zh-CN" altLang="en-US"/>
+        </a:p>
+      </dgm:t>
+    </dgm:pt>
+    <dgm:pt modelId="{77668710-AAAC-4623-99EC-7C970BFA954D}" type="sibTrans" cxnId="{28509449-6362-444F-8FEF-93E816F56080}">
+      <dgm:prSet/>
+      <dgm:spPr/>
+      <dgm:t>
+        <a:bodyPr/>
+        <a:lstStyle/>
+        <a:p>
+          <a:endParaRPr lang="zh-CN" altLang="en-US"/>
+        </a:p>
+      </dgm:t>
+    </dgm:pt>
+    <dgm:pt modelId="{81365D84-CA87-4190-82E8-365630A1B54A}">
+      <dgm:prSet phldrT="[Text]" custT="1"/>
+      <dgm:spPr/>
+      <dgm:t>
+        <a:bodyPr/>
+        <a:lstStyle/>
+        <a:p>
+          <a:pPr marL="0" lvl="0" indent="0" algn="ctr" defTabSz="1066800">
+            <a:lnSpc>
+              <a:spcPct val="90000"/>
+            </a:lnSpc>
+            <a:spcBef>
+              <a:spcPct val="0"/>
+            </a:spcBef>
+            <a:spcAft>
+              <a:spcPct val="35000"/>
+            </a:spcAft>
+            <a:buNone/>
+          </a:pPr>
+          <a:r>
+            <a:rPr lang="zh-CN" altLang="en-US" sz="2400" kern="1200" dirty="0">
+              <a:solidFill>
+                <a:prstClr val="black">
+                  <a:hueOff val="0"/>
+                  <a:satOff val="0"/>
+                  <a:lumOff val="0"/>
+                  <a:alphaOff val="0"/>
+                </a:prstClr>
+              </a:solidFill>
+              <a:latin typeface="等线" panose="020F0502020204030204"/>
+              <a:ea typeface="等线" panose="02010600030101010101" pitchFamily="2" charset="-122"/>
+              <a:cs typeface="+mn-cs"/>
+            </a:rPr>
+            <a:t>生成分析报告</a:t>
+          </a:r>
+        </a:p>
+      </dgm:t>
+    </dgm:pt>
+    <dgm:pt modelId="{BA8A35C3-CC59-44AA-8C10-5B0224753477}" type="parTrans" cxnId="{94A3AD47-2BE8-49D5-906C-A0529AA3F425}">
+      <dgm:prSet/>
+      <dgm:spPr/>
+      <dgm:t>
+        <a:bodyPr/>
+        <a:lstStyle/>
+        <a:p>
+          <a:endParaRPr lang="zh-CN" altLang="en-US"/>
+        </a:p>
+      </dgm:t>
+    </dgm:pt>
+    <dgm:pt modelId="{5E4E7A1C-7CEB-4D7B-A9EF-C33094BF94B2}" type="sibTrans" cxnId="{94A3AD47-2BE8-49D5-906C-A0529AA3F425}">
+      <dgm:prSet/>
+      <dgm:spPr/>
+      <dgm:t>
+        <a:bodyPr/>
+        <a:lstStyle/>
+        <a:p>
+          <a:endParaRPr lang="zh-CN" altLang="en-US"/>
+        </a:p>
+      </dgm:t>
+    </dgm:pt>
     <dgm:pt modelId="{BFD7EF35-5C4A-4047-8EBD-5D2D61F2A909}" type="pres">
       <dgm:prSet presAssocID="{8EBB37B7-8156-4053-8832-0810D27E02BE}" presName="Name0" presStyleCnt="0">
         <dgm:presLayoutVars>
@@ -1338,32 +1547,68 @@
       </dgm:prSet>
       <dgm:spPr/>
     </dgm:pt>
-    <dgm:pt modelId="{3CAE74BD-291A-42DF-997E-3150B94787B5}" type="pres">
-      <dgm:prSet presAssocID="{C015B29D-804E-4EF8-9CA5-0225CB9E3BAE}" presName="boxAndChildren" presStyleCnt="0"/>
+    <dgm:pt modelId="{AFAA6102-5656-449D-BCF3-7BEC3967D2BD}" type="pres">
+      <dgm:prSet presAssocID="{F94FE719-7531-4713-8AF1-C68C94FD57A7}" presName="boxAndChildren" presStyleCnt="0"/>
       <dgm:spPr/>
     </dgm:pt>
-    <dgm:pt modelId="{F98E5A0E-CCD4-4CB6-8B19-ECD1A17145F6}" type="pres">
-      <dgm:prSet presAssocID="{C015B29D-804E-4EF8-9CA5-0225CB9E3BAE}" presName="parentTextBox" presStyleLbl="node1" presStyleIdx="0" presStyleCnt="3"/>
+    <dgm:pt modelId="{026DB092-0108-41A3-BE9D-FFCDB2604287}" type="pres">
+      <dgm:prSet presAssocID="{F94FE719-7531-4713-8AF1-C68C94FD57A7}" presName="parentTextBox" presStyleLbl="node1" presStyleIdx="0" presStyleCnt="4"/>
       <dgm:spPr/>
     </dgm:pt>
-    <dgm:pt modelId="{DA5DF6C3-B61E-4453-B80D-579013059978}" type="pres">
-      <dgm:prSet presAssocID="{C015B29D-804E-4EF8-9CA5-0225CB9E3BAE}" presName="entireBox" presStyleLbl="node1" presStyleIdx="0" presStyleCnt="3"/>
+    <dgm:pt modelId="{16F19514-9868-4206-A030-F370330AD481}" type="pres">
+      <dgm:prSet presAssocID="{F94FE719-7531-4713-8AF1-C68C94FD57A7}" presName="entireBox" presStyleLbl="node1" presStyleIdx="0" presStyleCnt="4"/>
       <dgm:spPr/>
     </dgm:pt>
-    <dgm:pt modelId="{72B6D30F-CFBA-40DB-A4BC-FE665B47349F}" type="pres">
-      <dgm:prSet presAssocID="{C015B29D-804E-4EF8-9CA5-0225CB9E3BAE}" presName="descendantBox" presStyleCnt="0"/>
+    <dgm:pt modelId="{72790CF6-E12D-4043-8833-26EB00EE290B}" type="pres">
+      <dgm:prSet presAssocID="{F94FE719-7531-4713-8AF1-C68C94FD57A7}" presName="descendantBox" presStyleCnt="0"/>
       <dgm:spPr/>
     </dgm:pt>
-    <dgm:pt modelId="{31834D8F-2778-4D53-B8B4-9A1F925B215B}" type="pres">
-      <dgm:prSet presAssocID="{AC726CF2-703B-43D5-A598-659C4F3D7A26}" presName="childTextBox" presStyleLbl="fgAccFollowNode1" presStyleIdx="0" presStyleCnt="4">
+    <dgm:pt modelId="{10EC165A-DC94-4CD3-A254-02A90CE0F884}" type="pres">
+      <dgm:prSet presAssocID="{F9E5340C-038C-477B-870E-6127858D6470}" presName="childTextBox" presStyleLbl="fgAccFollowNode1" presStyleIdx="0" presStyleCnt="6">
         <dgm:presLayoutVars>
           <dgm:bulletEnabled val="1"/>
         </dgm:presLayoutVars>
       </dgm:prSet>
       <dgm:spPr/>
     </dgm:pt>
-    <dgm:pt modelId="{50BEA692-399D-4EB1-BE47-E2E44749DF32}" type="pres">
-      <dgm:prSet presAssocID="{13F76509-2677-4B94-8458-BF734967D29A}" presName="childTextBox" presStyleLbl="fgAccFollowNode1" presStyleIdx="1" presStyleCnt="4">
+    <dgm:pt modelId="{95F384A6-DEDE-4E30-AA5F-DEFDAEDCE7A2}" type="pres">
+      <dgm:prSet presAssocID="{81365D84-CA87-4190-82E8-365630A1B54A}" presName="childTextBox" presStyleLbl="fgAccFollowNode1" presStyleIdx="1" presStyleCnt="6">
+        <dgm:presLayoutVars>
+          <dgm:bulletEnabled val="1"/>
+        </dgm:presLayoutVars>
+      </dgm:prSet>
+      <dgm:spPr/>
+    </dgm:pt>
+    <dgm:pt modelId="{F8D4E615-E589-4077-96E1-E4E8EA295E9E}" type="pres">
+      <dgm:prSet presAssocID="{D55DC08E-AAB8-449F-9CF5-A6A657888637}" presName="sp" presStyleCnt="0"/>
+      <dgm:spPr/>
+    </dgm:pt>
+    <dgm:pt modelId="{EA7854F1-5AD2-4109-930B-1E064BD09122}" type="pres">
+      <dgm:prSet presAssocID="{C015B29D-804E-4EF8-9CA5-0225CB9E3BAE}" presName="arrowAndChildren" presStyleCnt="0"/>
+      <dgm:spPr/>
+    </dgm:pt>
+    <dgm:pt modelId="{4B53DDC7-A7BD-4683-A8DA-B2E824B60C8A}" type="pres">
+      <dgm:prSet presAssocID="{C015B29D-804E-4EF8-9CA5-0225CB9E3BAE}" presName="parentTextArrow" presStyleLbl="node1" presStyleIdx="0" presStyleCnt="4"/>
+      <dgm:spPr/>
+    </dgm:pt>
+    <dgm:pt modelId="{13DCD19E-87D6-42D9-A339-FE3DD4CE1FA5}" type="pres">
+      <dgm:prSet presAssocID="{C015B29D-804E-4EF8-9CA5-0225CB9E3BAE}" presName="arrow" presStyleLbl="node1" presStyleIdx="1" presStyleCnt="4"/>
+      <dgm:spPr/>
+    </dgm:pt>
+    <dgm:pt modelId="{303F85C8-EC97-4193-B24D-11D97E0EDFB5}" type="pres">
+      <dgm:prSet presAssocID="{C015B29D-804E-4EF8-9CA5-0225CB9E3BAE}" presName="descendantArrow" presStyleCnt="0"/>
+      <dgm:spPr/>
+    </dgm:pt>
+    <dgm:pt modelId="{70D49B6C-09BD-423A-AE9A-6415C3F02578}" type="pres">
+      <dgm:prSet presAssocID="{AC726CF2-703B-43D5-A598-659C4F3D7A26}" presName="childTextArrow" presStyleLbl="fgAccFollowNode1" presStyleIdx="2" presStyleCnt="6">
+        <dgm:presLayoutVars>
+          <dgm:bulletEnabled val="1"/>
+        </dgm:presLayoutVars>
+      </dgm:prSet>
+      <dgm:spPr/>
+    </dgm:pt>
+    <dgm:pt modelId="{4ED5A060-6B32-4D3E-A00B-7B2D21352085}" type="pres">
+      <dgm:prSet presAssocID="{13F76509-2677-4B94-8458-BF734967D29A}" presName="childTextArrow" presStyleLbl="fgAccFollowNode1" presStyleIdx="3" presStyleCnt="6">
         <dgm:presLayoutVars>
           <dgm:bulletEnabled val="1"/>
         </dgm:presLayoutVars>
@@ -1379,11 +1624,11 @@
       <dgm:spPr/>
     </dgm:pt>
     <dgm:pt modelId="{CBEA7663-DB68-43A0-9B78-F0AE18C0FCEB}" type="pres">
-      <dgm:prSet presAssocID="{C9878458-E7FA-4F2E-984B-30ABB9E467F6}" presName="parentTextArrow" presStyleLbl="node1" presStyleIdx="0" presStyleCnt="3"/>
+      <dgm:prSet presAssocID="{C9878458-E7FA-4F2E-984B-30ABB9E467F6}" presName="parentTextArrow" presStyleLbl="node1" presStyleIdx="1" presStyleCnt="4"/>
       <dgm:spPr/>
     </dgm:pt>
     <dgm:pt modelId="{43EED8E4-F5DA-4050-98A8-54D25BFA04E6}" type="pres">
-      <dgm:prSet presAssocID="{C9878458-E7FA-4F2E-984B-30ABB9E467F6}" presName="arrow" presStyleLbl="node1" presStyleIdx="1" presStyleCnt="3"/>
+      <dgm:prSet presAssocID="{C9878458-E7FA-4F2E-984B-30ABB9E467F6}" presName="arrow" presStyleLbl="node1" presStyleIdx="2" presStyleCnt="4"/>
       <dgm:spPr/>
     </dgm:pt>
     <dgm:pt modelId="{1FB98E0B-35A4-4359-8594-C52C8E1E626B}" type="pres">
@@ -1391,7 +1636,7 @@
       <dgm:spPr/>
     </dgm:pt>
     <dgm:pt modelId="{7C6B8609-067E-4710-A7EB-CCDA79BF9AD0}" type="pres">
-      <dgm:prSet presAssocID="{DDF4552D-986D-4D22-AC8D-BE17EC047369}" presName="childTextArrow" presStyleLbl="fgAccFollowNode1" presStyleIdx="2" presStyleCnt="4">
+      <dgm:prSet presAssocID="{DDF4552D-986D-4D22-AC8D-BE17EC047369}" presName="childTextArrow" presStyleLbl="fgAccFollowNode1" presStyleIdx="4" presStyleCnt="6">
         <dgm:presLayoutVars>
           <dgm:bulletEnabled val="1"/>
         </dgm:presLayoutVars>
@@ -1407,11 +1652,11 @@
       <dgm:spPr/>
     </dgm:pt>
     <dgm:pt modelId="{7DBF8424-23B9-48C7-A93C-1BD110EEFBF0}" type="pres">
-      <dgm:prSet presAssocID="{92FF3567-8DEC-4F46-BE13-B8F3C78A28AC}" presName="parentTextArrow" presStyleLbl="node1" presStyleIdx="1" presStyleCnt="3"/>
+      <dgm:prSet presAssocID="{92FF3567-8DEC-4F46-BE13-B8F3C78A28AC}" presName="parentTextArrow" presStyleLbl="node1" presStyleIdx="2" presStyleCnt="4"/>
       <dgm:spPr/>
     </dgm:pt>
     <dgm:pt modelId="{5EF61178-E400-4304-B678-497EA93D7EAD}" type="pres">
-      <dgm:prSet presAssocID="{92FF3567-8DEC-4F46-BE13-B8F3C78A28AC}" presName="arrow" presStyleLbl="node1" presStyleIdx="2" presStyleCnt="3"/>
+      <dgm:prSet presAssocID="{92FF3567-8DEC-4F46-BE13-B8F3C78A28AC}" presName="arrow" presStyleLbl="node1" presStyleIdx="3" presStyleCnt="4"/>
       <dgm:spPr/>
     </dgm:pt>
     <dgm:pt modelId="{1EDDF564-0FCD-47F4-8D0B-06D0511DF6D6}" type="pres">
@@ -1419,7 +1664,7 @@
       <dgm:spPr/>
     </dgm:pt>
     <dgm:pt modelId="{46290391-DF46-4FDC-8532-53E03000CF26}" type="pres">
-      <dgm:prSet presAssocID="{758A46AE-DFE4-47A6-84B2-B244B91C76B1}" presName="childTextArrow" presStyleLbl="fgAccFollowNode1" presStyleIdx="3" presStyleCnt="4">
+      <dgm:prSet presAssocID="{758A46AE-DFE4-47A6-84B2-B244B91C76B1}" presName="childTextArrow" presStyleLbl="fgAccFollowNode1" presStyleIdx="5" presStyleCnt="6">
         <dgm:presLayoutVars>
           <dgm:bulletEnabled val="1"/>
         </dgm:presLayoutVars>
@@ -1429,37 +1674,51 @@
   </dgm:ptLst>
   <dgm:cxnLst>
     <dgm:cxn modelId="{61B5050D-665B-45B6-86D8-A09C59B6364A}" type="presOf" srcId="{92FF3567-8DEC-4F46-BE13-B8F3C78A28AC}" destId="{5EF61178-E400-4304-B678-497EA93D7EAD}" srcOrd="1" destOrd="0" presId="urn:microsoft.com/office/officeart/2005/8/layout/process4"/>
-    <dgm:cxn modelId="{2FC51A13-E4FF-4078-B08A-8D58A40FAABC}" type="presOf" srcId="{C015B29D-804E-4EF8-9CA5-0225CB9E3BAE}" destId="{DA5DF6C3-B61E-4453-B80D-579013059978}" srcOrd="1" destOrd="0" presId="urn:microsoft.com/office/officeart/2005/8/layout/process4"/>
+    <dgm:cxn modelId="{5C668916-66E7-41A1-A1A5-0B84099780F8}" type="presOf" srcId="{C015B29D-804E-4EF8-9CA5-0225CB9E3BAE}" destId="{4B53DDC7-A7BD-4683-A8DA-B2E824B60C8A}" srcOrd="0" destOrd="0" presId="urn:microsoft.com/office/officeart/2005/8/layout/process4"/>
     <dgm:cxn modelId="{0B859C1A-85DF-417F-89AC-91A8F8C56BBB}" srcId="{C015B29D-804E-4EF8-9CA5-0225CB9E3BAE}" destId="{13F76509-2677-4B94-8458-BF734967D29A}" srcOrd="1" destOrd="0" parTransId="{1E148D99-19D1-47BF-9A17-2AC6BBEE3299}" sibTransId="{7071650A-F3A2-45EB-986A-66A312AD3232}"/>
-    <dgm:cxn modelId="{40C18A23-31AF-4731-8F72-0011CF15C8AC}" type="presOf" srcId="{AC726CF2-703B-43D5-A598-659C4F3D7A26}" destId="{31834D8F-2778-4D53-B8B4-9A1F925B215B}" srcOrd="0" destOrd="0" presId="urn:microsoft.com/office/officeart/2005/8/layout/process4"/>
     <dgm:cxn modelId="{35692234-1122-416C-A144-1B129BB3AEBD}" srcId="{C9878458-E7FA-4F2E-984B-30ABB9E467F6}" destId="{DDF4552D-986D-4D22-AC8D-BE17EC047369}" srcOrd="0" destOrd="0" parTransId="{5F58F03B-8865-4768-B1A3-2BA9DE3A7842}" sibTransId="{D0475B54-1FF1-4446-952B-ACF20DE3D74D}"/>
+    <dgm:cxn modelId="{486B5F35-58B2-42B7-B789-141AF5B256D7}" type="presOf" srcId="{C015B29D-804E-4EF8-9CA5-0225CB9E3BAE}" destId="{13DCD19E-87D6-42D9-A339-FE3DD4CE1FA5}" srcOrd="1" destOrd="0" presId="urn:microsoft.com/office/officeart/2005/8/layout/process4"/>
     <dgm:cxn modelId="{1B796541-8616-4BB9-96DA-1B8752E517CF}" srcId="{8EBB37B7-8156-4053-8832-0810D27E02BE}" destId="{C9878458-E7FA-4F2E-984B-30ABB9E467F6}" srcOrd="1" destOrd="0" parTransId="{419BE00B-35A8-47A6-8E7F-6027D9FAF7A4}" sibTransId="{198C4AE0-BE82-4DBA-A5E3-9EAE597E2B9C}"/>
     <dgm:cxn modelId="{BE59B061-9857-4990-82E3-BEE03025228E}" type="presOf" srcId="{92FF3567-8DEC-4F46-BE13-B8F3C78A28AC}" destId="{7DBF8424-23B9-48C7-A93C-1BD110EEFBF0}" srcOrd="0" destOrd="0" presId="urn:microsoft.com/office/officeart/2005/8/layout/process4"/>
     <dgm:cxn modelId="{F775F042-2350-4ED7-889E-E8AAD5055F41}" srcId="{C015B29D-804E-4EF8-9CA5-0225CB9E3BAE}" destId="{AC726CF2-703B-43D5-A598-659C4F3D7A26}" srcOrd="0" destOrd="0" parTransId="{EDC05EC2-0701-418B-A42D-D29FD8221BE9}" sibTransId="{E6ED2A25-932E-46E8-B6A8-529D6405B189}"/>
     <dgm:cxn modelId="{94B53144-7AB7-4540-B75C-9EEFF934C358}" type="presOf" srcId="{C9878458-E7FA-4F2E-984B-30ABB9E467F6}" destId="{CBEA7663-DB68-43A0-9B78-F0AE18C0FCEB}" srcOrd="0" destOrd="0" presId="urn:microsoft.com/office/officeart/2005/8/layout/process4"/>
+    <dgm:cxn modelId="{94A3AD47-2BE8-49D5-906C-A0529AA3F425}" srcId="{F94FE719-7531-4713-8AF1-C68C94FD57A7}" destId="{81365D84-CA87-4190-82E8-365630A1B54A}" srcOrd="1" destOrd="0" parTransId="{BA8A35C3-CC59-44AA-8C10-5B0224753477}" sibTransId="{5E4E7A1C-7CEB-4D7B-A9EF-C33094BF94B2}"/>
+    <dgm:cxn modelId="{28509449-6362-444F-8FEF-93E816F56080}" srcId="{F94FE719-7531-4713-8AF1-C68C94FD57A7}" destId="{F9E5340C-038C-477B-870E-6127858D6470}" srcOrd="0" destOrd="0" parTransId="{406C2359-CF31-415B-B390-06C98B76A688}" sibTransId="{77668710-AAAC-4623-99EC-7C970BFA954D}"/>
+    <dgm:cxn modelId="{7DD87158-ECEC-401E-9927-BB99CC0B93C6}" type="presOf" srcId="{F94FE719-7531-4713-8AF1-C68C94FD57A7}" destId="{16F19514-9868-4206-A030-F370330AD481}" srcOrd="1" destOrd="0" presId="urn:microsoft.com/office/officeart/2005/8/layout/process4"/>
     <dgm:cxn modelId="{2EC2167A-6382-4156-B668-47DB4B8E5591}" type="presOf" srcId="{C9878458-E7FA-4F2E-984B-30ABB9E467F6}" destId="{43EED8E4-F5DA-4050-98A8-54D25BFA04E6}" srcOrd="1" destOrd="0" presId="urn:microsoft.com/office/officeart/2005/8/layout/process4"/>
-    <dgm:cxn modelId="{22B5287F-692D-43E0-B162-F87A1101D68A}" type="presOf" srcId="{C015B29D-804E-4EF8-9CA5-0225CB9E3BAE}" destId="{F98E5A0E-CCD4-4CB6-8B19-ECD1A17145F6}" srcOrd="0" destOrd="0" presId="urn:microsoft.com/office/officeart/2005/8/layout/process4"/>
     <dgm:cxn modelId="{EC620A85-E8C7-4F20-942D-A149C0931820}" srcId="{8EBB37B7-8156-4053-8832-0810D27E02BE}" destId="{C015B29D-804E-4EF8-9CA5-0225CB9E3BAE}" srcOrd="2" destOrd="0" parTransId="{A35BEC9C-7C0F-42E7-BDDD-83B3213E3F2A}" sibTransId="{D55DC08E-AAB8-449F-9CF5-A6A657888637}"/>
+    <dgm:cxn modelId="{59355790-3818-4877-A420-2EB539E9105C}" type="presOf" srcId="{13F76509-2677-4B94-8458-BF734967D29A}" destId="{4ED5A060-6B32-4D3E-A00B-7B2D21352085}" srcOrd="0" destOrd="0" presId="urn:microsoft.com/office/officeart/2005/8/layout/process4"/>
+    <dgm:cxn modelId="{2A759A9A-E342-45E3-8F96-AB5A8C4F056A}" srcId="{8EBB37B7-8156-4053-8832-0810D27E02BE}" destId="{F94FE719-7531-4713-8AF1-C68C94FD57A7}" srcOrd="3" destOrd="0" parTransId="{DC31F5BD-AE59-41CD-817B-99449597D3F0}" sibTransId="{F139C07A-C0DF-45F7-8865-822F4B19F863}"/>
     <dgm:cxn modelId="{238E93A9-B88B-4A79-B6CD-598AEF53E579}" srcId="{92FF3567-8DEC-4F46-BE13-B8F3C78A28AC}" destId="{758A46AE-DFE4-47A6-84B2-B244B91C76B1}" srcOrd="0" destOrd="0" parTransId="{8083650F-C384-441D-8BC3-7A10BC0E5761}" sibTransId="{36F09642-045F-43FA-B21F-CC512067B2B7}"/>
-    <dgm:cxn modelId="{B4F572AE-AE57-4C67-BB7C-0042FF8260CD}" type="presOf" srcId="{13F76509-2677-4B94-8458-BF734967D29A}" destId="{50BEA692-399D-4EB1-BE47-E2E44749DF32}" srcOrd="0" destOrd="0" presId="urn:microsoft.com/office/officeart/2005/8/layout/process4"/>
+    <dgm:cxn modelId="{A13D08B7-5DAD-4926-9D8B-936346B8FDBE}" type="presOf" srcId="{81365D84-CA87-4190-82E8-365630A1B54A}" destId="{95F384A6-DEDE-4E30-AA5F-DEFDAEDCE7A2}" srcOrd="0" destOrd="0" presId="urn:microsoft.com/office/officeart/2005/8/layout/process4"/>
+    <dgm:cxn modelId="{A3D5CEB7-1EAD-4AE9-B1A3-6690F0F5B331}" type="presOf" srcId="{F9E5340C-038C-477B-870E-6127858D6470}" destId="{10EC165A-DC94-4CD3-A254-02A90CE0F884}" srcOrd="0" destOrd="0" presId="urn:microsoft.com/office/officeart/2005/8/layout/process4"/>
+    <dgm:cxn modelId="{B0899FC0-D2D7-488F-BAA3-A6F1C474B79B}" type="presOf" srcId="{F94FE719-7531-4713-8AF1-C68C94FD57A7}" destId="{026DB092-0108-41A3-BE9D-FFCDB2604287}" srcOrd="0" destOrd="0" presId="urn:microsoft.com/office/officeart/2005/8/layout/process4"/>
     <dgm:cxn modelId="{169508C3-B3FC-4910-8AE7-812E98F68593}" type="presOf" srcId="{758A46AE-DFE4-47A6-84B2-B244B91C76B1}" destId="{46290391-DF46-4FDC-8532-53E03000CF26}" srcOrd="0" destOrd="0" presId="urn:microsoft.com/office/officeart/2005/8/layout/process4"/>
     <dgm:cxn modelId="{B03A04CD-2D78-4E94-A3C9-AFD7154713EF}" srcId="{8EBB37B7-8156-4053-8832-0810D27E02BE}" destId="{92FF3567-8DEC-4F46-BE13-B8F3C78A28AC}" srcOrd="0" destOrd="0" parTransId="{1C66B255-8084-4068-87C2-E40F558A18E6}" sibTransId="{62A48781-463F-4F76-943E-612CE71A1127}"/>
     <dgm:cxn modelId="{2B1489D4-8928-47F9-9E33-242E2010A97F}" type="presOf" srcId="{8EBB37B7-8156-4053-8832-0810D27E02BE}" destId="{BFD7EF35-5C4A-4047-8EBD-5D2D61F2A909}" srcOrd="0" destOrd="0" presId="urn:microsoft.com/office/officeart/2005/8/layout/process4"/>
+    <dgm:cxn modelId="{ECD3F9EC-2271-4F61-8634-3A4A2DDFD294}" type="presOf" srcId="{AC726CF2-703B-43D5-A598-659C4F3D7A26}" destId="{70D49B6C-09BD-423A-AE9A-6415C3F02578}" srcOrd="0" destOrd="0" presId="urn:microsoft.com/office/officeart/2005/8/layout/process4"/>
     <dgm:cxn modelId="{285E8BF2-7EDF-43B3-AEA5-AA77E47EE13F}" type="presOf" srcId="{DDF4552D-986D-4D22-AC8D-BE17EC047369}" destId="{7C6B8609-067E-4710-A7EB-CCDA79BF9AD0}" srcOrd="0" destOrd="0" presId="urn:microsoft.com/office/officeart/2005/8/layout/process4"/>
-    <dgm:cxn modelId="{03CA7754-C951-4CF6-BF36-0188A4A97F25}" type="presParOf" srcId="{BFD7EF35-5C4A-4047-8EBD-5D2D61F2A909}" destId="{3CAE74BD-291A-42DF-997E-3150B94787B5}" srcOrd="0" destOrd="0" presId="urn:microsoft.com/office/officeart/2005/8/layout/process4"/>
-    <dgm:cxn modelId="{45DEE537-DB5C-465D-A3E7-CE34EA9B8130}" type="presParOf" srcId="{3CAE74BD-291A-42DF-997E-3150B94787B5}" destId="{F98E5A0E-CCD4-4CB6-8B19-ECD1A17145F6}" srcOrd="0" destOrd="0" presId="urn:microsoft.com/office/officeart/2005/8/layout/process4"/>
-    <dgm:cxn modelId="{45E8B27B-4AD3-4C10-806F-F6FC6F4D0556}" type="presParOf" srcId="{3CAE74BD-291A-42DF-997E-3150B94787B5}" destId="{DA5DF6C3-B61E-4453-B80D-579013059978}" srcOrd="1" destOrd="0" presId="urn:microsoft.com/office/officeart/2005/8/layout/process4"/>
-    <dgm:cxn modelId="{A45FDFF1-9CB3-4922-BF42-6B8D08A50E93}" type="presParOf" srcId="{3CAE74BD-291A-42DF-997E-3150B94787B5}" destId="{72B6D30F-CFBA-40DB-A4BC-FE665B47349F}" srcOrd="2" destOrd="0" presId="urn:microsoft.com/office/officeart/2005/8/layout/process4"/>
-    <dgm:cxn modelId="{4FA84D79-C317-4248-87EC-E0A36C6F07F6}" type="presParOf" srcId="{72B6D30F-CFBA-40DB-A4BC-FE665B47349F}" destId="{31834D8F-2778-4D53-B8B4-9A1F925B215B}" srcOrd="0" destOrd="0" presId="urn:microsoft.com/office/officeart/2005/8/layout/process4"/>
-    <dgm:cxn modelId="{989897B0-9485-4696-AFA9-8BB53FBFC14C}" type="presParOf" srcId="{72B6D30F-CFBA-40DB-A4BC-FE665B47349F}" destId="{50BEA692-399D-4EB1-BE47-E2E44749DF32}" srcOrd="1" destOrd="0" presId="urn:microsoft.com/office/officeart/2005/8/layout/process4"/>
-    <dgm:cxn modelId="{ADDE9258-9B9B-48A6-A6F5-627080C56B7B}" type="presParOf" srcId="{BFD7EF35-5C4A-4047-8EBD-5D2D61F2A909}" destId="{7E32F565-EBE5-42BC-9D78-F2018F26E951}" srcOrd="1" destOrd="0" presId="urn:microsoft.com/office/officeart/2005/8/layout/process4"/>
-    <dgm:cxn modelId="{17BFA5E4-A942-4BEC-BFB8-E6BBD14F38D8}" type="presParOf" srcId="{BFD7EF35-5C4A-4047-8EBD-5D2D61F2A909}" destId="{0848ACD2-2E71-46C2-8245-79491840EE1A}" srcOrd="2" destOrd="0" presId="urn:microsoft.com/office/officeart/2005/8/layout/process4"/>
+    <dgm:cxn modelId="{B71A512D-6E5E-4E75-86D3-A7B1292EAA19}" type="presParOf" srcId="{BFD7EF35-5C4A-4047-8EBD-5D2D61F2A909}" destId="{AFAA6102-5656-449D-BCF3-7BEC3967D2BD}" srcOrd="0" destOrd="0" presId="urn:microsoft.com/office/officeart/2005/8/layout/process4"/>
+    <dgm:cxn modelId="{B4D5CD08-02D6-46D0-AAFC-CCBE4056E4DB}" type="presParOf" srcId="{AFAA6102-5656-449D-BCF3-7BEC3967D2BD}" destId="{026DB092-0108-41A3-BE9D-FFCDB2604287}" srcOrd="0" destOrd="0" presId="urn:microsoft.com/office/officeart/2005/8/layout/process4"/>
+    <dgm:cxn modelId="{DA910189-025F-4C06-86A7-7CFF84B6AD62}" type="presParOf" srcId="{AFAA6102-5656-449D-BCF3-7BEC3967D2BD}" destId="{16F19514-9868-4206-A030-F370330AD481}" srcOrd="1" destOrd="0" presId="urn:microsoft.com/office/officeart/2005/8/layout/process4"/>
+    <dgm:cxn modelId="{6B675018-B9CC-4671-B813-E21B862009C7}" type="presParOf" srcId="{AFAA6102-5656-449D-BCF3-7BEC3967D2BD}" destId="{72790CF6-E12D-4043-8833-26EB00EE290B}" srcOrd="2" destOrd="0" presId="urn:microsoft.com/office/officeart/2005/8/layout/process4"/>
+    <dgm:cxn modelId="{B83B6AB4-B19B-4A8E-9D35-CE1D26A0DFB1}" type="presParOf" srcId="{72790CF6-E12D-4043-8833-26EB00EE290B}" destId="{10EC165A-DC94-4CD3-A254-02A90CE0F884}" srcOrd="0" destOrd="0" presId="urn:microsoft.com/office/officeart/2005/8/layout/process4"/>
+    <dgm:cxn modelId="{04040543-2975-4CD8-A9DF-F1E36B965B91}" type="presParOf" srcId="{72790CF6-E12D-4043-8833-26EB00EE290B}" destId="{95F384A6-DEDE-4E30-AA5F-DEFDAEDCE7A2}" srcOrd="1" destOrd="0" presId="urn:microsoft.com/office/officeart/2005/8/layout/process4"/>
+    <dgm:cxn modelId="{4D6BFCF3-9D93-4C3D-9F59-A34409028380}" type="presParOf" srcId="{BFD7EF35-5C4A-4047-8EBD-5D2D61F2A909}" destId="{F8D4E615-E589-4077-96E1-E4E8EA295E9E}" srcOrd="1" destOrd="0" presId="urn:microsoft.com/office/officeart/2005/8/layout/process4"/>
+    <dgm:cxn modelId="{25C00E06-F6DE-4278-B4A4-3AD2E6D48A8B}" type="presParOf" srcId="{BFD7EF35-5C4A-4047-8EBD-5D2D61F2A909}" destId="{EA7854F1-5AD2-4109-930B-1E064BD09122}" srcOrd="2" destOrd="0" presId="urn:microsoft.com/office/officeart/2005/8/layout/process4"/>
+    <dgm:cxn modelId="{497E0E26-C85E-403E-9800-A438D9A17155}" type="presParOf" srcId="{EA7854F1-5AD2-4109-930B-1E064BD09122}" destId="{4B53DDC7-A7BD-4683-A8DA-B2E824B60C8A}" srcOrd="0" destOrd="0" presId="urn:microsoft.com/office/officeart/2005/8/layout/process4"/>
+    <dgm:cxn modelId="{8A1B9CF0-B988-4C9F-B22D-671321192B04}" type="presParOf" srcId="{EA7854F1-5AD2-4109-930B-1E064BD09122}" destId="{13DCD19E-87D6-42D9-A339-FE3DD4CE1FA5}" srcOrd="1" destOrd="0" presId="urn:microsoft.com/office/officeart/2005/8/layout/process4"/>
+    <dgm:cxn modelId="{BD2721A5-F864-448B-9283-BE1EEDD2C931}" type="presParOf" srcId="{EA7854F1-5AD2-4109-930B-1E064BD09122}" destId="{303F85C8-EC97-4193-B24D-11D97E0EDFB5}" srcOrd="2" destOrd="0" presId="urn:microsoft.com/office/officeart/2005/8/layout/process4"/>
+    <dgm:cxn modelId="{970C7111-3488-426A-936F-ECDDA36F9778}" type="presParOf" srcId="{303F85C8-EC97-4193-B24D-11D97E0EDFB5}" destId="{70D49B6C-09BD-423A-AE9A-6415C3F02578}" srcOrd="0" destOrd="0" presId="urn:microsoft.com/office/officeart/2005/8/layout/process4"/>
+    <dgm:cxn modelId="{93818A4A-C341-4771-B08C-19A4D4BD1593}" type="presParOf" srcId="{303F85C8-EC97-4193-B24D-11D97E0EDFB5}" destId="{4ED5A060-6B32-4D3E-A00B-7B2D21352085}" srcOrd="1" destOrd="0" presId="urn:microsoft.com/office/officeart/2005/8/layout/process4"/>
+    <dgm:cxn modelId="{ADDE9258-9B9B-48A6-A6F5-627080C56B7B}" type="presParOf" srcId="{BFD7EF35-5C4A-4047-8EBD-5D2D61F2A909}" destId="{7E32F565-EBE5-42BC-9D78-F2018F26E951}" srcOrd="3" destOrd="0" presId="urn:microsoft.com/office/officeart/2005/8/layout/process4"/>
+    <dgm:cxn modelId="{17BFA5E4-A942-4BEC-BFB8-E6BBD14F38D8}" type="presParOf" srcId="{BFD7EF35-5C4A-4047-8EBD-5D2D61F2A909}" destId="{0848ACD2-2E71-46C2-8245-79491840EE1A}" srcOrd="4" destOrd="0" presId="urn:microsoft.com/office/officeart/2005/8/layout/process4"/>
     <dgm:cxn modelId="{B99AB640-8C5E-4118-B57B-F4BAC3F51FC1}" type="presParOf" srcId="{0848ACD2-2E71-46C2-8245-79491840EE1A}" destId="{CBEA7663-DB68-43A0-9B78-F0AE18C0FCEB}" srcOrd="0" destOrd="0" presId="urn:microsoft.com/office/officeart/2005/8/layout/process4"/>
     <dgm:cxn modelId="{33BE4214-92BF-45BC-B3BD-0BDD0E3CD104}" type="presParOf" srcId="{0848ACD2-2E71-46C2-8245-79491840EE1A}" destId="{43EED8E4-F5DA-4050-98A8-54D25BFA04E6}" srcOrd="1" destOrd="0" presId="urn:microsoft.com/office/officeart/2005/8/layout/process4"/>
     <dgm:cxn modelId="{2FEA71C4-A284-4764-BB0C-D8E0846F1706}" type="presParOf" srcId="{0848ACD2-2E71-46C2-8245-79491840EE1A}" destId="{1FB98E0B-35A4-4359-8594-C52C8E1E626B}" srcOrd="2" destOrd="0" presId="urn:microsoft.com/office/officeart/2005/8/layout/process4"/>
     <dgm:cxn modelId="{20DE020F-6BD9-4001-BEC8-3FBADD6C2E9F}" type="presParOf" srcId="{1FB98E0B-35A4-4359-8594-C52C8E1E626B}" destId="{7C6B8609-067E-4710-A7EB-CCDA79BF9AD0}" srcOrd="0" destOrd="0" presId="urn:microsoft.com/office/officeart/2005/8/layout/process4"/>
-    <dgm:cxn modelId="{86886156-09DE-4034-B7D2-CCCC52E8D188}" type="presParOf" srcId="{BFD7EF35-5C4A-4047-8EBD-5D2D61F2A909}" destId="{17047EDA-9AE8-4A56-9887-2CDCEBB4D33F}" srcOrd="3" destOrd="0" presId="urn:microsoft.com/office/officeart/2005/8/layout/process4"/>
-    <dgm:cxn modelId="{2447E3B9-68E9-4C21-A89D-C2407130080F}" type="presParOf" srcId="{BFD7EF35-5C4A-4047-8EBD-5D2D61F2A909}" destId="{633372AA-53A3-4B32-9461-30F8202976E3}" srcOrd="4" destOrd="0" presId="urn:microsoft.com/office/officeart/2005/8/layout/process4"/>
+    <dgm:cxn modelId="{86886156-09DE-4034-B7D2-CCCC52E8D188}" type="presParOf" srcId="{BFD7EF35-5C4A-4047-8EBD-5D2D61F2A909}" destId="{17047EDA-9AE8-4A56-9887-2CDCEBB4D33F}" srcOrd="5" destOrd="0" presId="urn:microsoft.com/office/officeart/2005/8/layout/process4"/>
+    <dgm:cxn modelId="{2447E3B9-68E9-4C21-A89D-C2407130080F}" type="presParOf" srcId="{BFD7EF35-5C4A-4047-8EBD-5D2D61F2A909}" destId="{633372AA-53A3-4B32-9461-30F8202976E3}" srcOrd="6" destOrd="0" presId="urn:microsoft.com/office/officeart/2005/8/layout/process4"/>
     <dgm:cxn modelId="{C66BE113-60E2-4A59-891D-018A30AAFBA2}" type="presParOf" srcId="{633372AA-53A3-4B32-9461-30F8202976E3}" destId="{7DBF8424-23B9-48C7-A93C-1BD110EEFBF0}" srcOrd="0" destOrd="0" presId="urn:microsoft.com/office/officeart/2005/8/layout/process4"/>
     <dgm:cxn modelId="{1E615D20-216A-48A7-BA12-E181754184D3}" type="presParOf" srcId="{633372AA-53A3-4B32-9461-30F8202976E3}" destId="{5EF61178-E400-4304-B678-497EA93D7EAD}" srcOrd="1" destOrd="0" presId="urn:microsoft.com/office/officeart/2005/8/layout/process4"/>
     <dgm:cxn modelId="{1386A8C7-B01C-4A5C-B6F0-A537C3BADA90}" type="presParOf" srcId="{633372AA-53A3-4B32-9461-30F8202976E3}" destId="{1EDDF564-0FCD-47F4-8D0B-06D0511DF6D6}" srcOrd="2" destOrd="0" presId="urn:microsoft.com/office/officeart/2005/8/layout/process4"/>
@@ -1483,15 +1742,15 @@
       <dsp:cNvGrpSpPr/>
     </dsp:nvGrpSpPr>
     <dsp:grpSpPr/>
-    <dsp:sp modelId="{DA5DF6C3-B61E-4453-B80D-579013059978}">
+    <dsp:sp modelId="{16F19514-9868-4206-A030-F370330AD481}">
       <dsp:nvSpPr>
         <dsp:cNvPr id="0" name=""/>
         <dsp:cNvSpPr/>
       </dsp:nvSpPr>
       <dsp:spPr>
         <a:xfrm>
-          <a:off x="0" y="4078917"/>
-          <a:ext cx="5878945" cy="1338791"/>
+          <a:off x="0" y="4444481"/>
+          <a:ext cx="5878945" cy="972343"/>
         </a:xfrm>
         <a:prstGeom prst="rect">
           <a:avLst/>
@@ -1569,6 +1828,327 @@
         </a:bodyPr>
         <a:lstStyle/>
         <a:p>
+          <a:pPr marL="0" lvl="0" indent="0" algn="ctr" defTabSz="1066800">
+            <a:lnSpc>
+              <a:spcPct val="90000"/>
+            </a:lnSpc>
+            <a:spcBef>
+              <a:spcPct val="0"/>
+            </a:spcBef>
+            <a:spcAft>
+              <a:spcPct val="35000"/>
+            </a:spcAft>
+            <a:buNone/>
+          </a:pPr>
+          <a:r>
+            <a:rPr lang="zh-CN" altLang="en-US" sz="3600" kern="1200" dirty="0">
+              <a:solidFill>
+                <a:prstClr val="black">
+                  <a:hueOff val="0"/>
+                  <a:satOff val="0"/>
+                  <a:lumOff val="0"/>
+                  <a:alphaOff val="0"/>
+                </a:prstClr>
+              </a:solidFill>
+              <a:latin typeface="+mn-lt"/>
+              <a:ea typeface="等线" panose="02010600030101010101" pitchFamily="2" charset="-122"/>
+              <a:cs typeface="+mn-cs"/>
+            </a:rPr>
+            <a:t>结果展示</a:t>
+          </a:r>
+        </a:p>
+      </dsp:txBody>
+      <dsp:txXfrm>
+        <a:off x="0" y="4444481"/>
+        <a:ext cx="5878945" cy="525065"/>
+      </dsp:txXfrm>
+    </dsp:sp>
+    <dsp:sp modelId="{10EC165A-DC94-4CD3-A254-02A90CE0F884}">
+      <dsp:nvSpPr>
+        <dsp:cNvPr id="0" name=""/>
+        <dsp:cNvSpPr/>
+      </dsp:nvSpPr>
+      <dsp:spPr>
+        <a:xfrm>
+          <a:off x="0" y="4950099"/>
+          <a:ext cx="2939472" cy="447278"/>
+        </a:xfrm>
+        <a:prstGeom prst="rect">
+          <a:avLst/>
+        </a:prstGeom>
+        <a:solidFill>
+          <a:schemeClr val="accent1">
+            <a:alpha val="90000"/>
+            <a:tint val="40000"/>
+            <a:hueOff val="0"/>
+            <a:satOff val="0"/>
+            <a:lumOff val="0"/>
+            <a:alphaOff val="0"/>
+          </a:schemeClr>
+        </a:solidFill>
+        <a:ln w="6350" cap="flat" cmpd="sng" algn="ctr">
+          <a:solidFill>
+            <a:schemeClr val="accent1">
+              <a:alpha val="90000"/>
+              <a:tint val="40000"/>
+              <a:hueOff val="0"/>
+              <a:satOff val="0"/>
+              <a:lumOff val="0"/>
+              <a:alphaOff val="0"/>
+            </a:schemeClr>
+          </a:solidFill>
+          <a:prstDash val="solid"/>
+          <a:miter lim="800000"/>
+        </a:ln>
+        <a:effectLst/>
+      </dsp:spPr>
+      <dsp:style>
+        <a:lnRef idx="1">
+          <a:scrgbClr r="0" g="0" b="0"/>
+        </a:lnRef>
+        <a:fillRef idx="1">
+          <a:scrgbClr r="0" g="0" b="0"/>
+        </a:fillRef>
+        <a:effectRef idx="0">
+          <a:scrgbClr r="0" g="0" b="0"/>
+        </a:effectRef>
+        <a:fontRef idx="minor"/>
+      </dsp:style>
+      <dsp:txBody>
+        <a:bodyPr spcFirstLastPara="0" vert="horz" wrap="square" lIns="170688" tIns="30480" rIns="170688" bIns="30480" numCol="1" spcCol="1270" anchor="ctr" anchorCtr="0">
+          <a:noAutofit/>
+        </a:bodyPr>
+        <a:lstStyle/>
+        <a:p>
+          <a:pPr marL="0" lvl="0" indent="0" algn="ctr" defTabSz="1066800">
+            <a:lnSpc>
+              <a:spcPct val="90000"/>
+            </a:lnSpc>
+            <a:spcBef>
+              <a:spcPct val="0"/>
+            </a:spcBef>
+            <a:spcAft>
+              <a:spcPct val="35000"/>
+            </a:spcAft>
+            <a:buNone/>
+          </a:pPr>
+          <a:r>
+            <a:rPr lang="en-US" altLang="zh-CN" sz="2400" kern="1200" dirty="0">
+              <a:solidFill>
+                <a:prstClr val="black">
+                  <a:hueOff val="0"/>
+                  <a:satOff val="0"/>
+                  <a:lumOff val="0"/>
+                  <a:alphaOff val="0"/>
+                </a:prstClr>
+              </a:solidFill>
+              <a:latin typeface="等线" panose="020F0502020204030204"/>
+              <a:ea typeface="等线" panose="02010600030101010101" pitchFamily="2" charset="-122"/>
+              <a:cs typeface="+mn-cs"/>
+            </a:rPr>
+            <a:t>3D</a:t>
+          </a:r>
+          <a:r>
+            <a:rPr lang="zh-CN" altLang="en-US" sz="2400" kern="1200" dirty="0">
+              <a:solidFill>
+                <a:prstClr val="black">
+                  <a:hueOff val="0"/>
+                  <a:satOff val="0"/>
+                  <a:lumOff val="0"/>
+                  <a:alphaOff val="0"/>
+                </a:prstClr>
+              </a:solidFill>
+              <a:latin typeface="等线" panose="020F0502020204030204"/>
+              <a:ea typeface="等线" panose="02010600030101010101" pitchFamily="2" charset="-122"/>
+              <a:cs typeface="+mn-cs"/>
+            </a:rPr>
+            <a:t>展示</a:t>
+          </a:r>
+        </a:p>
+      </dsp:txBody>
+      <dsp:txXfrm>
+        <a:off x="0" y="4950099"/>
+        <a:ext cx="2939472" cy="447278"/>
+      </dsp:txXfrm>
+    </dsp:sp>
+    <dsp:sp modelId="{95F384A6-DEDE-4E30-AA5F-DEFDAEDCE7A2}">
+      <dsp:nvSpPr>
+        <dsp:cNvPr id="0" name=""/>
+        <dsp:cNvSpPr/>
+      </dsp:nvSpPr>
+      <dsp:spPr>
+        <a:xfrm>
+          <a:off x="2939472" y="4950099"/>
+          <a:ext cx="2939472" cy="447278"/>
+        </a:xfrm>
+        <a:prstGeom prst="rect">
+          <a:avLst/>
+        </a:prstGeom>
+        <a:solidFill>
+          <a:schemeClr val="accent1">
+            <a:alpha val="90000"/>
+            <a:tint val="40000"/>
+            <a:hueOff val="0"/>
+            <a:satOff val="0"/>
+            <a:lumOff val="0"/>
+            <a:alphaOff val="0"/>
+          </a:schemeClr>
+        </a:solidFill>
+        <a:ln w="6350" cap="flat" cmpd="sng" algn="ctr">
+          <a:solidFill>
+            <a:schemeClr val="accent1">
+              <a:alpha val="90000"/>
+              <a:tint val="40000"/>
+              <a:hueOff val="0"/>
+              <a:satOff val="0"/>
+              <a:lumOff val="0"/>
+              <a:alphaOff val="0"/>
+            </a:schemeClr>
+          </a:solidFill>
+          <a:prstDash val="solid"/>
+          <a:miter lim="800000"/>
+        </a:ln>
+        <a:effectLst/>
+      </dsp:spPr>
+      <dsp:style>
+        <a:lnRef idx="1">
+          <a:scrgbClr r="0" g="0" b="0"/>
+        </a:lnRef>
+        <a:fillRef idx="1">
+          <a:scrgbClr r="0" g="0" b="0"/>
+        </a:fillRef>
+        <a:effectRef idx="0">
+          <a:scrgbClr r="0" g="0" b="0"/>
+        </a:effectRef>
+        <a:fontRef idx="minor"/>
+      </dsp:style>
+      <dsp:txBody>
+        <a:bodyPr spcFirstLastPara="0" vert="horz" wrap="square" lIns="170688" tIns="30480" rIns="170688" bIns="30480" numCol="1" spcCol="1270" anchor="ctr" anchorCtr="0">
+          <a:noAutofit/>
+        </a:bodyPr>
+        <a:lstStyle/>
+        <a:p>
+          <a:pPr marL="0" lvl="0" indent="0" algn="ctr" defTabSz="1066800">
+            <a:lnSpc>
+              <a:spcPct val="90000"/>
+            </a:lnSpc>
+            <a:spcBef>
+              <a:spcPct val="0"/>
+            </a:spcBef>
+            <a:spcAft>
+              <a:spcPct val="35000"/>
+            </a:spcAft>
+            <a:buNone/>
+          </a:pPr>
+          <a:r>
+            <a:rPr lang="zh-CN" altLang="en-US" sz="2400" kern="1200" dirty="0">
+              <a:solidFill>
+                <a:prstClr val="black">
+                  <a:hueOff val="0"/>
+                  <a:satOff val="0"/>
+                  <a:lumOff val="0"/>
+                  <a:alphaOff val="0"/>
+                </a:prstClr>
+              </a:solidFill>
+              <a:latin typeface="等线" panose="020F0502020204030204"/>
+              <a:ea typeface="等线" panose="02010600030101010101" pitchFamily="2" charset="-122"/>
+              <a:cs typeface="+mn-cs"/>
+            </a:rPr>
+            <a:t>生成分析报告</a:t>
+          </a:r>
+        </a:p>
+      </dsp:txBody>
+      <dsp:txXfrm>
+        <a:off x="2939472" y="4950099"/>
+        <a:ext cx="2939472" cy="447278"/>
+      </dsp:txXfrm>
+    </dsp:sp>
+    <dsp:sp modelId="{13DCD19E-87D6-42D9-A339-FE3DD4CE1FA5}">
+      <dsp:nvSpPr>
+        <dsp:cNvPr id="0" name=""/>
+        <dsp:cNvSpPr/>
+      </dsp:nvSpPr>
+      <dsp:spPr>
+        <a:xfrm rot="10800000">
+          <a:off x="0" y="2963601"/>
+          <a:ext cx="5878945" cy="1495464"/>
+        </a:xfrm>
+        <a:prstGeom prst="upArrowCallout">
+          <a:avLst/>
+        </a:prstGeom>
+        <a:gradFill rotWithShape="0">
+          <a:gsLst>
+            <a:gs pos="0">
+              <a:schemeClr val="accent1">
+                <a:shade val="80000"/>
+                <a:hueOff val="116428"/>
+                <a:satOff val="-2085"/>
+                <a:lumOff val="8862"/>
+                <a:alphaOff val="0"/>
+                <a:lumMod val="110000"/>
+                <a:satMod val="105000"/>
+                <a:tint val="67000"/>
+              </a:schemeClr>
+            </a:gs>
+            <a:gs pos="50000">
+              <a:schemeClr val="accent1">
+                <a:shade val="80000"/>
+                <a:hueOff val="116428"/>
+                <a:satOff val="-2085"/>
+                <a:lumOff val="8862"/>
+                <a:alphaOff val="0"/>
+                <a:lumMod val="105000"/>
+                <a:satMod val="103000"/>
+                <a:tint val="73000"/>
+              </a:schemeClr>
+            </a:gs>
+            <a:gs pos="100000">
+              <a:schemeClr val="accent1">
+                <a:shade val="80000"/>
+                <a:hueOff val="116428"/>
+                <a:satOff val="-2085"/>
+                <a:lumOff val="8862"/>
+                <a:alphaOff val="0"/>
+                <a:lumMod val="105000"/>
+                <a:satMod val="109000"/>
+                <a:tint val="81000"/>
+              </a:schemeClr>
+            </a:gs>
+          </a:gsLst>
+          <a:lin ang="5400000" scaled="0"/>
+        </a:gradFill>
+        <a:ln>
+          <a:noFill/>
+        </a:ln>
+        <a:effectLst/>
+        <a:scene3d>
+          <a:camera prst="orthographicFront"/>
+          <a:lightRig rig="flat" dir="t"/>
+        </a:scene3d>
+        <a:sp3d prstMaterial="dkEdge">
+          <a:bevelT w="8200" h="38100"/>
+        </a:sp3d>
+      </dsp:spPr>
+      <dsp:style>
+        <a:lnRef idx="0">
+          <a:scrgbClr r="0" g="0" b="0"/>
+        </a:lnRef>
+        <a:fillRef idx="2">
+          <a:scrgbClr r="0" g="0" b="0"/>
+        </a:fillRef>
+        <a:effectRef idx="1">
+          <a:scrgbClr r="0" g="0" b="0"/>
+        </a:effectRef>
+        <a:fontRef idx="minor">
+          <a:schemeClr val="dk1"/>
+        </a:fontRef>
+      </dsp:style>
+      <dsp:txBody>
+        <a:bodyPr spcFirstLastPara="0" vert="horz" wrap="square" lIns="256032" tIns="256032" rIns="256032" bIns="256032" numCol="1" spcCol="1270" anchor="ctr" anchorCtr="0">
+          <a:noAutofit/>
+        </a:bodyPr>
+        <a:lstStyle/>
+        <a:p>
           <a:pPr marL="0" lvl="0" indent="0" algn="ctr" defTabSz="1600200">
             <a:lnSpc>
               <a:spcPct val="90000"/>
@@ -1582,25 +2162,27 @@
             <a:buNone/>
           </a:pPr>
           <a:r>
-            <a:rPr lang="zh-CN" altLang="en-US" sz="3600" kern="1200" dirty="0"/>
+            <a:rPr lang="zh-CN" altLang="en-US" sz="3600" kern="1200" dirty="0">
+              <a:latin typeface="+mn-lt"/>
+            </a:rPr>
             <a:t>统计分析</a:t>
           </a:r>
         </a:p>
       </dsp:txBody>
-      <dsp:txXfrm>
-        <a:off x="0" y="4078917"/>
-        <a:ext cx="5878945" cy="722947"/>
+      <dsp:txXfrm rot="-10800000">
+        <a:off x="0" y="2963601"/>
+        <a:ext cx="5878945" cy="524908"/>
       </dsp:txXfrm>
     </dsp:sp>
-    <dsp:sp modelId="{31834D8F-2778-4D53-B8B4-9A1F925B215B}">
+    <dsp:sp modelId="{70D49B6C-09BD-423A-AE9A-6415C3F02578}">
       <dsp:nvSpPr>
         <dsp:cNvPr id="0" name=""/>
         <dsp:cNvSpPr/>
       </dsp:nvSpPr>
       <dsp:spPr>
         <a:xfrm>
-          <a:off x="0" y="4775089"/>
-          <a:ext cx="2939472" cy="615844"/>
+          <a:off x="0" y="3488509"/>
+          <a:ext cx="2939472" cy="447143"/>
         </a:xfrm>
         <a:prstGeom prst="rect">
           <a:avLst/>
@@ -1680,19 +2262,19 @@
         </a:p>
       </dsp:txBody>
       <dsp:txXfrm>
-        <a:off x="0" y="4775089"/>
-        <a:ext cx="2939472" cy="615844"/>
+        <a:off x="0" y="3488509"/>
+        <a:ext cx="2939472" cy="447143"/>
       </dsp:txXfrm>
     </dsp:sp>
-    <dsp:sp modelId="{50BEA692-399D-4EB1-BE47-E2E44749DF32}">
+    <dsp:sp modelId="{4ED5A060-6B32-4D3E-A00B-7B2D21352085}">
       <dsp:nvSpPr>
         <dsp:cNvPr id="0" name=""/>
         <dsp:cNvSpPr/>
       </dsp:nvSpPr>
       <dsp:spPr>
         <a:xfrm>
-          <a:off x="2939472" y="4775089"/>
-          <a:ext cx="2939472" cy="615844"/>
+          <a:off x="2939472" y="3488509"/>
+          <a:ext cx="2939472" cy="447143"/>
         </a:xfrm>
         <a:prstGeom prst="rect">
           <a:avLst/>
@@ -1804,8 +2386,8 @@
         </a:p>
       </dsp:txBody>
       <dsp:txXfrm>
-        <a:off x="2939472" y="4775089"/>
-        <a:ext cx="2939472" cy="615844"/>
+        <a:off x="2939472" y="3488509"/>
+        <a:ext cx="2939472" cy="447143"/>
       </dsp:txXfrm>
     </dsp:sp>
     <dsp:sp modelId="{43EED8E4-F5DA-4050-98A8-54D25BFA04E6}">
@@ -1815,8 +2397,8 @@
       </dsp:nvSpPr>
       <dsp:spPr>
         <a:xfrm rot="10800000">
-          <a:off x="0" y="2039937"/>
-          <a:ext cx="5878945" cy="2059061"/>
+          <a:off x="0" y="1482721"/>
+          <a:ext cx="5878945" cy="1495464"/>
         </a:xfrm>
         <a:prstGeom prst="upArrowCallout">
           <a:avLst/>
@@ -1826,9 +2408,9 @@
             <a:gs pos="0">
               <a:schemeClr val="accent1">
                 <a:shade val="80000"/>
-                <a:hueOff val="174641"/>
-                <a:satOff val="-3128"/>
-                <a:lumOff val="13293"/>
+                <a:hueOff val="232855"/>
+                <a:satOff val="-4171"/>
+                <a:lumOff val="17723"/>
                 <a:alphaOff val="0"/>
                 <a:lumMod val="110000"/>
                 <a:satMod val="105000"/>
@@ -1838,9 +2420,9 @@
             <a:gs pos="50000">
               <a:schemeClr val="accent1">
                 <a:shade val="80000"/>
-                <a:hueOff val="174641"/>
-                <a:satOff val="-3128"/>
-                <a:lumOff val="13293"/>
+                <a:hueOff val="232855"/>
+                <a:satOff val="-4171"/>
+                <a:lumOff val="17723"/>
                 <a:alphaOff val="0"/>
                 <a:lumMod val="105000"/>
                 <a:satMod val="103000"/>
@@ -1850,9 +2432,9 @@
             <a:gs pos="100000">
               <a:schemeClr val="accent1">
                 <a:shade val="80000"/>
-                <a:hueOff val="174641"/>
-                <a:satOff val="-3128"/>
-                <a:lumOff val="13293"/>
+                <a:hueOff val="232855"/>
+                <a:satOff val="-4171"/>
+                <a:lumOff val="17723"/>
                 <a:alphaOff val="0"/>
                 <a:lumMod val="105000"/>
                 <a:satMod val="109000"/>
@@ -1907,14 +2489,16 @@
             <a:buNone/>
           </a:pPr>
           <a:r>
-            <a:rPr lang="zh-CN" altLang="en-US" sz="3600" kern="1200" dirty="0"/>
+            <a:rPr lang="zh-CN" altLang="en-US" sz="3600" kern="1200" dirty="0">
+              <a:latin typeface="+mn-lt"/>
+            </a:rPr>
             <a:t>数据预处理</a:t>
           </a:r>
         </a:p>
       </dsp:txBody>
       <dsp:txXfrm rot="-10800000">
-        <a:off x="0" y="2039937"/>
-        <a:ext cx="5878945" cy="722730"/>
+        <a:off x="0" y="1482721"/>
+        <a:ext cx="5878945" cy="524908"/>
       </dsp:txXfrm>
     </dsp:sp>
     <dsp:sp modelId="{7C6B8609-067E-4710-A7EB-CCDA79BF9AD0}">
@@ -1924,8 +2508,8 @@
       </dsp:nvSpPr>
       <dsp:spPr>
         <a:xfrm>
-          <a:off x="0" y="2762668"/>
-          <a:ext cx="5878945" cy="615659"/>
+          <a:off x="0" y="2007629"/>
+          <a:ext cx="5878945" cy="447143"/>
         </a:xfrm>
         <a:prstGeom prst="rect">
           <a:avLst/>
@@ -2001,8 +2585,8 @@
         </a:p>
       </dsp:txBody>
       <dsp:txXfrm>
-        <a:off x="0" y="2762668"/>
-        <a:ext cx="5878945" cy="615659"/>
+        <a:off x="0" y="2007629"/>
+        <a:ext cx="5878945" cy="447143"/>
       </dsp:txXfrm>
     </dsp:sp>
     <dsp:sp modelId="{5EF61178-E400-4304-B678-497EA93D7EAD}">
@@ -2012,8 +2596,8 @@
       </dsp:nvSpPr>
       <dsp:spPr>
         <a:xfrm rot="10800000">
-          <a:off x="0" y="957"/>
-          <a:ext cx="5878945" cy="2059061"/>
+          <a:off x="0" y="1842"/>
+          <a:ext cx="5878945" cy="1495464"/>
         </a:xfrm>
         <a:prstGeom prst="upArrowCallout">
           <a:avLst/>
@@ -2104,14 +2688,16 @@
             <a:buNone/>
           </a:pPr>
           <a:r>
-            <a:rPr lang="zh-CN" altLang="en-US" sz="3600" kern="1200" dirty="0"/>
+            <a:rPr lang="zh-CN" altLang="en-US" sz="3600" kern="1200" dirty="0">
+              <a:latin typeface="+mn-lt"/>
+            </a:rPr>
             <a:t>数据载入</a:t>
           </a:r>
         </a:p>
       </dsp:txBody>
       <dsp:txXfrm rot="-10800000">
-        <a:off x="0" y="957"/>
-        <a:ext cx="5878945" cy="722730"/>
+        <a:off x="0" y="1842"/>
+        <a:ext cx="5878945" cy="524908"/>
       </dsp:txXfrm>
     </dsp:sp>
     <dsp:sp modelId="{46290391-DF46-4FDC-8532-53E03000CF26}">
@@ -2121,8 +2707,8 @@
       </dsp:nvSpPr>
       <dsp:spPr>
         <a:xfrm>
-          <a:off x="0" y="723688"/>
-          <a:ext cx="5878945" cy="615659"/>
+          <a:off x="0" y="526750"/>
+          <a:ext cx="5878945" cy="447143"/>
         </a:xfrm>
         <a:prstGeom prst="rect">
           <a:avLst/>
@@ -2190,8 +2776,8 @@
         </a:p>
       </dsp:txBody>
       <dsp:txXfrm>
-        <a:off x="0" y="723688"/>
-        <a:ext cx="5878945" cy="615659"/>
+        <a:off x="0" y="526750"/>
+        <a:ext cx="5878945" cy="447143"/>
       </dsp:txXfrm>
     </dsp:sp>
   </dsp:spTree>
@@ -3760,7 +4346,7 @@
           <a:p>
             <a:fld id="{DA207E81-3FC7-4CE2-8E9A-33FCAA24BF42}" type="datetimeFigureOut">
               <a:rPr lang="zh-CN" altLang="en-US" smtClean="0"/>
-              <a:t>2018/12/4</a:t>
+              <a:t>2018/12/5</a:t>
             </a:fld>
             <a:endParaRPr lang="zh-CN" altLang="en-US"/>
           </a:p>
@@ -3960,7 +4546,7 @@
           <a:p>
             <a:fld id="{DA207E81-3FC7-4CE2-8E9A-33FCAA24BF42}" type="datetimeFigureOut">
               <a:rPr lang="zh-CN" altLang="en-US" smtClean="0"/>
-              <a:t>2018/12/4</a:t>
+              <a:t>2018/12/5</a:t>
             </a:fld>
             <a:endParaRPr lang="zh-CN" altLang="en-US"/>
           </a:p>
@@ -4170,7 +4756,7 @@
           <a:p>
             <a:fld id="{DA207E81-3FC7-4CE2-8E9A-33FCAA24BF42}" type="datetimeFigureOut">
               <a:rPr lang="zh-CN" altLang="en-US" smtClean="0"/>
-              <a:t>2018/12/4</a:t>
+              <a:t>2018/12/5</a:t>
             </a:fld>
             <a:endParaRPr lang="zh-CN" altLang="en-US"/>
           </a:p>
@@ -4370,7 +4956,7 @@
           <a:p>
             <a:fld id="{DA207E81-3FC7-4CE2-8E9A-33FCAA24BF42}" type="datetimeFigureOut">
               <a:rPr lang="zh-CN" altLang="en-US" smtClean="0"/>
-              <a:t>2018/12/4</a:t>
+              <a:t>2018/12/5</a:t>
             </a:fld>
             <a:endParaRPr lang="zh-CN" altLang="en-US"/>
           </a:p>
@@ -4646,7 +5232,7 @@
           <a:p>
             <a:fld id="{DA207E81-3FC7-4CE2-8E9A-33FCAA24BF42}" type="datetimeFigureOut">
               <a:rPr lang="zh-CN" altLang="en-US" smtClean="0"/>
-              <a:t>2018/12/4</a:t>
+              <a:t>2018/12/5</a:t>
             </a:fld>
             <a:endParaRPr lang="zh-CN" altLang="en-US"/>
           </a:p>
@@ -4914,7 +5500,7 @@
           <a:p>
             <a:fld id="{DA207E81-3FC7-4CE2-8E9A-33FCAA24BF42}" type="datetimeFigureOut">
               <a:rPr lang="zh-CN" altLang="en-US" smtClean="0"/>
-              <a:t>2018/12/4</a:t>
+              <a:t>2018/12/5</a:t>
             </a:fld>
             <a:endParaRPr lang="zh-CN" altLang="en-US"/>
           </a:p>
@@ -5329,7 +5915,7 @@
           <a:p>
             <a:fld id="{DA207E81-3FC7-4CE2-8E9A-33FCAA24BF42}" type="datetimeFigureOut">
               <a:rPr lang="zh-CN" altLang="en-US" smtClean="0"/>
-              <a:t>2018/12/4</a:t>
+              <a:t>2018/12/5</a:t>
             </a:fld>
             <a:endParaRPr lang="zh-CN" altLang="en-US"/>
           </a:p>
@@ -5471,7 +6057,7 @@
           <a:p>
             <a:fld id="{DA207E81-3FC7-4CE2-8E9A-33FCAA24BF42}" type="datetimeFigureOut">
               <a:rPr lang="zh-CN" altLang="en-US" smtClean="0"/>
-              <a:t>2018/12/4</a:t>
+              <a:t>2018/12/5</a:t>
             </a:fld>
             <a:endParaRPr lang="zh-CN" altLang="en-US"/>
           </a:p>
@@ -5584,7 +6170,7 @@
           <a:p>
             <a:fld id="{DA207E81-3FC7-4CE2-8E9A-33FCAA24BF42}" type="datetimeFigureOut">
               <a:rPr lang="zh-CN" altLang="en-US" smtClean="0"/>
-              <a:t>2018/12/4</a:t>
+              <a:t>2018/12/5</a:t>
             </a:fld>
             <a:endParaRPr lang="zh-CN" altLang="en-US"/>
           </a:p>
@@ -5897,7 +6483,7 @@
           <a:p>
             <a:fld id="{DA207E81-3FC7-4CE2-8E9A-33FCAA24BF42}" type="datetimeFigureOut">
               <a:rPr lang="zh-CN" altLang="en-US" smtClean="0"/>
-              <a:t>2018/12/4</a:t>
+              <a:t>2018/12/5</a:t>
             </a:fld>
             <a:endParaRPr lang="zh-CN" altLang="en-US"/>
           </a:p>
@@ -6186,7 +6772,7 @@
           <a:p>
             <a:fld id="{DA207E81-3FC7-4CE2-8E9A-33FCAA24BF42}" type="datetimeFigureOut">
               <a:rPr lang="zh-CN" altLang="en-US" smtClean="0"/>
-              <a:t>2018/12/4</a:t>
+              <a:t>2018/12/5</a:t>
             </a:fld>
             <a:endParaRPr lang="zh-CN" altLang="en-US"/>
           </a:p>
@@ -6429,7 +7015,7 @@
           <a:p>
             <a:fld id="{DA207E81-3FC7-4CE2-8E9A-33FCAA24BF42}" type="datetimeFigureOut">
               <a:rPr lang="zh-CN" altLang="en-US" smtClean="0"/>
-              <a:t>2018/12/4</a:t>
+              <a:t>2018/12/5</a:t>
             </a:fld>
             <a:endParaRPr lang="zh-CN" altLang="en-US"/>
           </a:p>
@@ -6859,7 +7445,7 @@
           <p:nvPr>
             <p:extLst>
               <p:ext uri="{D42A27DB-BD31-4B8C-83A1-F6EECF244321}">
-                <p14:modId xmlns:p14="http://schemas.microsoft.com/office/powerpoint/2010/main" val="2714482782"/>
+                <p14:modId xmlns:p14="http://schemas.microsoft.com/office/powerpoint/2010/main" val="2667368533"/>
               </p:ext>
             </p:extLst>
           </p:nvPr>
@@ -6978,10 +7564,10 @@
       </p:grpSpPr>
       <p:pic>
         <p:nvPicPr>
-          <p:cNvPr id="4" name="Content Placeholder 3">
-            <a:extLst>
-              <a:ext uri="{FF2B5EF4-FFF2-40B4-BE49-F238E27FC236}">
-                <a16:creationId xmlns:a16="http://schemas.microsoft.com/office/drawing/2014/main" id="{36091851-2254-4A2C-9038-ACDA7169E236}"/>
+          <p:cNvPr id="13" name="Content Placeholder 12">
+            <a:extLst>
+              <a:ext uri="{FF2B5EF4-FFF2-40B4-BE49-F238E27FC236}">
+                <a16:creationId xmlns:a16="http://schemas.microsoft.com/office/drawing/2014/main" id="{0889DFEA-0410-4ED6-9C3F-21B14BF11E6C}"/>
               </a:ext>
             </a:extLst>
           </p:cNvPr>
@@ -6994,13 +7580,13 @@
         </p:nvPicPr>
         <p:blipFill rotWithShape="1">
           <a:blip r:embed="rId2"/>
-          <a:srcRect l="1061" t="374" r="1751" b="2183"/>
+          <a:srcRect l="1262" r="1809" b="1951"/>
           <a:stretch/>
         </p:blipFill>
         <p:spPr>
           <a:xfrm>
-            <a:off x="1896533" y="978284"/>
-            <a:ext cx="8339667" cy="5519496"/>
+            <a:off x="1890381" y="949100"/>
+            <a:ext cx="8330430" cy="5562534"/>
           </a:xfrm>
           <a:prstGeom prst="rect">
             <a:avLst/>
@@ -9686,6 +10272,1008 @@
     <p:extLst>
       <p:ext uri="{BB962C8B-B14F-4D97-AF65-F5344CB8AC3E}">
         <p14:creationId xmlns:p14="http://schemas.microsoft.com/office/powerpoint/2010/main" val="2288892032"/>
+      </p:ext>
+    </p:extLst>
+  </p:cSld>
+  <p:clrMapOvr>
+    <a:masterClrMapping/>
+  </p:clrMapOvr>
+</p:sld>
+</file>
+
+<file path=ppt/slides/slide6.xml><?xml version="1.0" encoding="utf-8"?>
+<p:sld xmlns:a="http://schemas.openxmlformats.org/drawingml/2006/main" xmlns:r="http://schemas.openxmlformats.org/officeDocument/2006/relationships" xmlns:p="http://schemas.openxmlformats.org/presentationml/2006/main">
+  <p:cSld>
+    <p:spTree>
+      <p:nvGrpSpPr>
+        <p:cNvPr id="1" name=""/>
+        <p:cNvGrpSpPr/>
+        <p:nvPr/>
+      </p:nvGrpSpPr>
+      <p:grpSpPr>
+        <a:xfrm>
+          <a:off x="0" y="0"/>
+          <a:ext cx="0" cy="0"/>
+          <a:chOff x="0" y="0"/>
+          <a:chExt cx="0" cy="0"/>
+        </a:xfrm>
+      </p:grpSpPr>
+      <p:pic>
+        <p:nvPicPr>
+          <p:cNvPr id="14" name="Picture 13">
+            <a:extLst>
+              <a:ext uri="{FF2B5EF4-FFF2-40B4-BE49-F238E27FC236}">
+                <a16:creationId xmlns:a16="http://schemas.microsoft.com/office/drawing/2014/main" id="{BF17C7A3-009C-4848-BAEA-E294F8D6DB73}"/>
+              </a:ext>
+            </a:extLst>
+          </p:cNvPr>
+          <p:cNvPicPr>
+            <a:picLocks noChangeAspect="1"/>
+          </p:cNvPicPr>
+          <p:nvPr/>
+        </p:nvPicPr>
+        <p:blipFill rotWithShape="1">
+          <a:blip r:embed="rId2"/>
+          <a:srcRect l="1762" t="-283" r="1510" b="3443"/>
+          <a:stretch/>
+        </p:blipFill>
+        <p:spPr>
+          <a:xfrm>
+            <a:off x="6591856" y="1232851"/>
+            <a:ext cx="4916483" cy="4392298"/>
+          </a:xfrm>
+          <a:prstGeom prst="rect">
+            <a:avLst/>
+          </a:prstGeom>
+        </p:spPr>
+      </p:pic>
+      <p:sp>
+        <p:nvSpPr>
+          <p:cNvPr id="8" name="TextBox 7">
+            <a:extLst>
+              <a:ext uri="{FF2B5EF4-FFF2-40B4-BE49-F238E27FC236}">
+                <a16:creationId xmlns:a16="http://schemas.microsoft.com/office/drawing/2014/main" id="{8357E5BD-06F4-4CC2-BD6B-B797050263E0}"/>
+              </a:ext>
+            </a:extLst>
+          </p:cNvPr>
+          <p:cNvSpPr txBox="1"/>
+          <p:nvPr/>
+        </p:nvSpPr>
+        <p:spPr>
+          <a:xfrm>
+            <a:off x="3850604" y="387931"/>
+            <a:ext cx="4490791" cy="584775"/>
+          </a:xfrm>
+          <a:prstGeom prst="rect">
+            <a:avLst/>
+          </a:prstGeom>
+          <a:noFill/>
+        </p:spPr>
+        <p:txBody>
+          <a:bodyPr wrap="square" rtlCol="0">
+            <a:spAutoFit/>
+          </a:bodyPr>
+          <a:lstStyle/>
+          <a:p>
+            <a:pPr algn="ctr"/>
+            <a:r>
+              <a:rPr lang="en-US" altLang="zh-CN" sz="3200" b="1" dirty="0">
+                <a:solidFill>
+                  <a:srgbClr val="FF0000"/>
+                </a:solidFill>
+              </a:rPr>
+              <a:t>3D</a:t>
+            </a:r>
+            <a:r>
+              <a:rPr lang="zh-CN" altLang="en-US" sz="3200" b="1" dirty="0">
+                <a:solidFill>
+                  <a:srgbClr val="FF0000"/>
+                </a:solidFill>
+              </a:rPr>
+              <a:t> 展 示</a:t>
+            </a:r>
+          </a:p>
+        </p:txBody>
+      </p:sp>
+      <p:pic>
+        <p:nvPicPr>
+          <p:cNvPr id="16" name="Content Placeholder 12">
+            <a:extLst>
+              <a:ext uri="{FF2B5EF4-FFF2-40B4-BE49-F238E27FC236}">
+                <a16:creationId xmlns:a16="http://schemas.microsoft.com/office/drawing/2014/main" id="{53D1D988-704F-4B94-9FFF-C862BC2E12D6}"/>
+              </a:ext>
+            </a:extLst>
+          </p:cNvPr>
+          <p:cNvPicPr>
+            <a:picLocks noGrp="1" noChangeAspect="1"/>
+          </p:cNvPicPr>
+          <p:nvPr>
+            <p:ph idx="1"/>
+          </p:nvPr>
+        </p:nvPicPr>
+        <p:blipFill rotWithShape="1">
+          <a:blip r:embed="rId3"/>
+          <a:srcRect l="1262" t="62883" r="69793" b="1951"/>
+          <a:stretch/>
+        </p:blipFill>
+        <p:spPr>
+          <a:xfrm>
+            <a:off x="524369" y="1385499"/>
+            <a:ext cx="4274892" cy="3428382"/>
+          </a:xfrm>
+          <a:prstGeom prst="rect">
+            <a:avLst/>
+          </a:prstGeom>
+        </p:spPr>
+      </p:pic>
+      <p:sp>
+        <p:nvSpPr>
+          <p:cNvPr id="20" name="Rectangle 19">
+            <a:extLst>
+              <a:ext uri="{FF2B5EF4-FFF2-40B4-BE49-F238E27FC236}">
+                <a16:creationId xmlns:a16="http://schemas.microsoft.com/office/drawing/2014/main" id="{6DC1BD92-ED24-4EA7-8202-3BDF487FE172}"/>
+              </a:ext>
+            </a:extLst>
+          </p:cNvPr>
+          <p:cNvSpPr/>
+          <p:nvPr/>
+        </p:nvSpPr>
+        <p:spPr>
+          <a:xfrm>
+            <a:off x="817055" y="3928234"/>
+            <a:ext cx="1785495" cy="575980"/>
+          </a:xfrm>
+          <a:prstGeom prst="rect">
+            <a:avLst/>
+          </a:prstGeom>
+          <a:noFill/>
+          <a:ln w="38100">
+            <a:solidFill>
+              <a:srgbClr val="0070C0"/>
+            </a:solidFill>
+          </a:ln>
+        </p:spPr>
+        <p:style>
+          <a:lnRef idx="2">
+            <a:schemeClr val="accent1">
+              <a:shade val="50000"/>
+            </a:schemeClr>
+          </a:lnRef>
+          <a:fillRef idx="1">
+            <a:schemeClr val="accent1"/>
+          </a:fillRef>
+          <a:effectRef idx="0">
+            <a:schemeClr val="accent1"/>
+          </a:effectRef>
+          <a:fontRef idx="minor">
+            <a:schemeClr val="lt1"/>
+          </a:fontRef>
+        </p:style>
+        <p:txBody>
+          <a:bodyPr rtlCol="0" anchor="ctr"/>
+          <a:lstStyle/>
+          <a:p>
+            <a:pPr algn="ctr"/>
+            <a:endParaRPr lang="zh-CN" altLang="en-US"/>
+          </a:p>
+        </p:txBody>
+      </p:sp>
+      <p:sp>
+        <p:nvSpPr>
+          <p:cNvPr id="23" name="TextBox 22">
+            <a:extLst>
+              <a:ext uri="{FF2B5EF4-FFF2-40B4-BE49-F238E27FC236}">
+                <a16:creationId xmlns:a16="http://schemas.microsoft.com/office/drawing/2014/main" id="{0B7CB43D-57F4-4599-9326-9403BFF82C82}"/>
+              </a:ext>
+            </a:extLst>
+          </p:cNvPr>
+          <p:cNvSpPr txBox="1"/>
+          <p:nvPr/>
+        </p:nvSpPr>
+        <p:spPr>
+          <a:xfrm>
+            <a:off x="3480818" y="4932651"/>
+            <a:ext cx="2636886" cy="1384995"/>
+          </a:xfrm>
+          <a:prstGeom prst="rect">
+            <a:avLst/>
+          </a:prstGeom>
+          <a:noFill/>
+        </p:spPr>
+        <p:txBody>
+          <a:bodyPr wrap="square" rtlCol="0">
+            <a:spAutoFit/>
+          </a:bodyPr>
+          <a:lstStyle/>
+          <a:p>
+            <a:pPr algn="ctr"/>
+            <a:r>
+              <a:rPr lang="en-US" altLang="zh-CN" sz="2400" dirty="0">
+                <a:solidFill>
+                  <a:srgbClr val="0070C0"/>
+                </a:solidFill>
+              </a:rPr>
+              <a:t>3D</a:t>
+            </a:r>
+            <a:r>
+              <a:rPr lang="zh-CN" altLang="en-US" sz="2400" dirty="0">
+                <a:solidFill>
+                  <a:srgbClr val="0070C0"/>
+                </a:solidFill>
+              </a:rPr>
+              <a:t>展示按钮</a:t>
+            </a:r>
+            <a:endParaRPr lang="en-US" altLang="zh-CN" sz="2400" dirty="0">
+              <a:solidFill>
+                <a:srgbClr val="0070C0"/>
+              </a:solidFill>
+            </a:endParaRPr>
+          </a:p>
+          <a:p>
+            <a:pPr algn="ctr"/>
+            <a:r>
+              <a:rPr lang="en-US" altLang="zh-CN" sz="2000" dirty="0">
+                <a:solidFill>
+                  <a:schemeClr val="tx1">
+                    <a:lumMod val="50000"/>
+                    <a:lumOff val="50000"/>
+                  </a:schemeClr>
+                </a:solidFill>
+              </a:rPr>
+              <a:t>(</a:t>
+            </a:r>
+            <a:r>
+              <a:rPr lang="zh-CN" altLang="en-US" sz="2000" dirty="0">
+                <a:solidFill>
+                  <a:schemeClr val="tx1">
+                    <a:lumMod val="50000"/>
+                    <a:lumOff val="50000"/>
+                  </a:schemeClr>
+                </a:solidFill>
+              </a:rPr>
+              <a:t>展示效应点和靶点在皮层中的位置，</a:t>
+            </a:r>
+            <a:br>
+              <a:rPr lang="en-US" altLang="zh-CN" sz="2000" dirty="0">
+                <a:solidFill>
+                  <a:schemeClr val="tx1">
+                    <a:lumMod val="50000"/>
+                    <a:lumOff val="50000"/>
+                  </a:schemeClr>
+                </a:solidFill>
+              </a:rPr>
+            </a:br>
+            <a:r>
+              <a:rPr lang="zh-CN" altLang="en-US" sz="2000" dirty="0">
+                <a:solidFill>
+                  <a:schemeClr val="tx1">
+                    <a:lumMod val="50000"/>
+                    <a:lumOff val="50000"/>
+                  </a:schemeClr>
+                </a:solidFill>
+              </a:rPr>
+              <a:t>如右图所示。</a:t>
+            </a:r>
+            <a:r>
+              <a:rPr lang="en-US" altLang="zh-CN" sz="2000" dirty="0">
+                <a:solidFill>
+                  <a:schemeClr val="tx1">
+                    <a:lumMod val="50000"/>
+                    <a:lumOff val="50000"/>
+                  </a:schemeClr>
+                </a:solidFill>
+              </a:rPr>
+              <a:t>)</a:t>
+            </a:r>
+            <a:endParaRPr lang="zh-CN" altLang="en-US" sz="2000" dirty="0">
+              <a:solidFill>
+                <a:schemeClr val="tx1">
+                  <a:lumMod val="50000"/>
+                  <a:lumOff val="50000"/>
+                </a:schemeClr>
+              </a:solidFill>
+            </a:endParaRPr>
+          </a:p>
+        </p:txBody>
+      </p:sp>
+      <p:cxnSp>
+        <p:nvCxnSpPr>
+          <p:cNvPr id="25" name="Straight Arrow Connector 24">
+            <a:extLst>
+              <a:ext uri="{FF2B5EF4-FFF2-40B4-BE49-F238E27FC236}">
+                <a16:creationId xmlns:a16="http://schemas.microsoft.com/office/drawing/2014/main" id="{B3C903FC-A472-40CE-8F85-2F5911576C32}"/>
+              </a:ext>
+            </a:extLst>
+          </p:cNvPr>
+          <p:cNvCxnSpPr>
+            <a:cxnSpLocks/>
+            <a:stCxn id="23" idx="1"/>
+          </p:cNvCxnSpPr>
+          <p:nvPr/>
+        </p:nvCxnSpPr>
+        <p:spPr>
+          <a:xfrm flipH="1" flipV="1">
+            <a:off x="2661815" y="4622984"/>
+            <a:ext cx="819003" cy="1002165"/>
+          </a:xfrm>
+          <a:prstGeom prst="straightConnector1">
+            <a:avLst/>
+          </a:prstGeom>
+          <a:ln w="57150">
+            <a:solidFill>
+              <a:srgbClr val="0070C0"/>
+            </a:solidFill>
+            <a:tailEnd type="triangle" w="lg" len="lg"/>
+          </a:ln>
+        </p:spPr>
+        <p:style>
+          <a:lnRef idx="1">
+            <a:schemeClr val="accent1"/>
+          </a:lnRef>
+          <a:fillRef idx="0">
+            <a:schemeClr val="accent1"/>
+          </a:fillRef>
+          <a:effectRef idx="0">
+            <a:schemeClr val="accent1"/>
+          </a:effectRef>
+          <a:fontRef idx="minor">
+            <a:schemeClr val="tx1"/>
+          </a:fontRef>
+        </p:style>
+      </p:cxnSp>
+      <p:sp>
+        <p:nvSpPr>
+          <p:cNvPr id="18" name="TextBox 17">
+            <a:extLst>
+              <a:ext uri="{FF2B5EF4-FFF2-40B4-BE49-F238E27FC236}">
+                <a16:creationId xmlns:a16="http://schemas.microsoft.com/office/drawing/2014/main" id="{777FDC59-06ED-4BD3-8748-2B7433DE29F7}"/>
+              </a:ext>
+            </a:extLst>
+          </p:cNvPr>
+          <p:cNvSpPr txBox="1"/>
+          <p:nvPr/>
+        </p:nvSpPr>
+        <p:spPr>
+          <a:xfrm rot="20166651">
+            <a:off x="7595082" y="4993184"/>
+            <a:ext cx="4164039" cy="830997"/>
+          </a:xfrm>
+          <a:prstGeom prst="rect">
+            <a:avLst/>
+          </a:prstGeom>
+          <a:noFill/>
+        </p:spPr>
+        <p:txBody>
+          <a:bodyPr wrap="square" rtlCol="0">
+            <a:spAutoFit/>
+          </a:bodyPr>
+          <a:lstStyle/>
+          <a:p>
+            <a:r>
+              <a:rPr lang="zh-CN" altLang="en-US" sz="2400" b="1" dirty="0">
+                <a:solidFill>
+                  <a:srgbClr val="FF0000"/>
+                </a:solidFill>
+              </a:rPr>
+              <a:t>此图为动态图，</a:t>
+            </a:r>
+            <a:br>
+              <a:rPr lang="en-US" altLang="zh-CN" sz="2400" b="1" dirty="0">
+                <a:solidFill>
+                  <a:srgbClr val="FF0000"/>
+                </a:solidFill>
+              </a:rPr>
+            </a:br>
+            <a:r>
+              <a:rPr lang="zh-CN" altLang="en-US" sz="2400" b="1" dirty="0">
+                <a:solidFill>
+                  <a:srgbClr val="FF0000"/>
+                </a:solidFill>
+              </a:rPr>
+              <a:t>会随鼠标移动而产生</a:t>
+            </a:r>
+            <a:r>
+              <a:rPr lang="en-US" altLang="zh-CN" sz="2400" b="1" dirty="0">
+                <a:solidFill>
+                  <a:srgbClr val="FF0000"/>
+                </a:solidFill>
+              </a:rPr>
+              <a:t>3D</a:t>
+            </a:r>
+            <a:r>
+              <a:rPr lang="zh-CN" altLang="en-US" sz="2400" b="1" dirty="0">
+                <a:solidFill>
+                  <a:srgbClr val="FF0000"/>
+                </a:solidFill>
+              </a:rPr>
+              <a:t>旋转。</a:t>
+            </a:r>
+          </a:p>
+        </p:txBody>
+      </p:sp>
+    </p:spTree>
+    <p:extLst>
+      <p:ext uri="{BB962C8B-B14F-4D97-AF65-F5344CB8AC3E}">
+        <p14:creationId xmlns:p14="http://schemas.microsoft.com/office/powerpoint/2010/main" val="2530084486"/>
+      </p:ext>
+    </p:extLst>
+  </p:cSld>
+  <p:clrMapOvr>
+    <a:masterClrMapping/>
+  </p:clrMapOvr>
+</p:sld>
+</file>
+
+<file path=ppt/slides/slide7.xml><?xml version="1.0" encoding="utf-8"?>
+<p:sld xmlns:a="http://schemas.openxmlformats.org/drawingml/2006/main" xmlns:r="http://schemas.openxmlformats.org/officeDocument/2006/relationships" xmlns:p="http://schemas.openxmlformats.org/presentationml/2006/main">
+  <p:cSld>
+    <p:spTree>
+      <p:nvGrpSpPr>
+        <p:cNvPr id="1" name=""/>
+        <p:cNvGrpSpPr/>
+        <p:nvPr/>
+      </p:nvGrpSpPr>
+      <p:grpSpPr>
+        <a:xfrm>
+          <a:off x="0" y="0"/>
+          <a:ext cx="0" cy="0"/>
+          <a:chOff x="0" y="0"/>
+          <a:chExt cx="0" cy="0"/>
+        </a:xfrm>
+      </p:grpSpPr>
+      <p:sp>
+        <p:nvSpPr>
+          <p:cNvPr id="8" name="TextBox 7">
+            <a:extLst>
+              <a:ext uri="{FF2B5EF4-FFF2-40B4-BE49-F238E27FC236}">
+                <a16:creationId xmlns:a16="http://schemas.microsoft.com/office/drawing/2014/main" id="{8357E5BD-06F4-4CC2-BD6B-B797050263E0}"/>
+              </a:ext>
+            </a:extLst>
+          </p:cNvPr>
+          <p:cNvSpPr txBox="1"/>
+          <p:nvPr/>
+        </p:nvSpPr>
+        <p:spPr>
+          <a:xfrm>
+            <a:off x="3850604" y="387931"/>
+            <a:ext cx="4490791" cy="584775"/>
+          </a:xfrm>
+          <a:prstGeom prst="rect">
+            <a:avLst/>
+          </a:prstGeom>
+          <a:noFill/>
+        </p:spPr>
+        <p:txBody>
+          <a:bodyPr wrap="square" rtlCol="0">
+            <a:spAutoFit/>
+          </a:bodyPr>
+          <a:lstStyle/>
+          <a:p>
+            <a:pPr algn="ctr"/>
+            <a:r>
+              <a:rPr lang="zh-CN" altLang="en-US" sz="3200" b="1" dirty="0">
+                <a:solidFill>
+                  <a:srgbClr val="FF0000"/>
+                </a:solidFill>
+              </a:rPr>
+              <a:t>生 成 分 析 报 告</a:t>
+            </a:r>
+          </a:p>
+        </p:txBody>
+      </p:sp>
+      <p:pic>
+        <p:nvPicPr>
+          <p:cNvPr id="16" name="Content Placeholder 12">
+            <a:extLst>
+              <a:ext uri="{FF2B5EF4-FFF2-40B4-BE49-F238E27FC236}">
+                <a16:creationId xmlns:a16="http://schemas.microsoft.com/office/drawing/2014/main" id="{53D1D988-704F-4B94-9FFF-C862BC2E12D6}"/>
+              </a:ext>
+            </a:extLst>
+          </p:cNvPr>
+          <p:cNvPicPr>
+            <a:picLocks noGrp="1" noChangeAspect="1"/>
+          </p:cNvPicPr>
+          <p:nvPr>
+            <p:ph idx="1"/>
+          </p:nvPr>
+        </p:nvPicPr>
+        <p:blipFill rotWithShape="1">
+          <a:blip r:embed="rId2"/>
+          <a:srcRect l="1262" t="62883" r="69793" b="1951"/>
+          <a:stretch/>
+        </p:blipFill>
+        <p:spPr>
+          <a:xfrm>
+            <a:off x="150294" y="1385499"/>
+            <a:ext cx="4274892" cy="3428382"/>
+          </a:xfrm>
+          <a:prstGeom prst="rect">
+            <a:avLst/>
+          </a:prstGeom>
+        </p:spPr>
+      </p:pic>
+      <p:sp>
+        <p:nvSpPr>
+          <p:cNvPr id="20" name="Rectangle 19">
+            <a:extLst>
+              <a:ext uri="{FF2B5EF4-FFF2-40B4-BE49-F238E27FC236}">
+                <a16:creationId xmlns:a16="http://schemas.microsoft.com/office/drawing/2014/main" id="{6DC1BD92-ED24-4EA7-8202-3BDF487FE172}"/>
+              </a:ext>
+            </a:extLst>
+          </p:cNvPr>
+          <p:cNvSpPr/>
+          <p:nvPr/>
+        </p:nvSpPr>
+        <p:spPr>
+          <a:xfrm>
+            <a:off x="2287740" y="3926748"/>
+            <a:ext cx="1785495" cy="575980"/>
+          </a:xfrm>
+          <a:prstGeom prst="rect">
+            <a:avLst/>
+          </a:prstGeom>
+          <a:noFill/>
+          <a:ln w="38100">
+            <a:solidFill>
+              <a:srgbClr val="0070C0"/>
+            </a:solidFill>
+          </a:ln>
+        </p:spPr>
+        <p:style>
+          <a:lnRef idx="2">
+            <a:schemeClr val="accent1">
+              <a:shade val="50000"/>
+            </a:schemeClr>
+          </a:lnRef>
+          <a:fillRef idx="1">
+            <a:schemeClr val="accent1"/>
+          </a:fillRef>
+          <a:effectRef idx="0">
+            <a:schemeClr val="accent1"/>
+          </a:effectRef>
+          <a:fontRef idx="minor">
+            <a:schemeClr val="lt1"/>
+          </a:fontRef>
+        </p:style>
+        <p:txBody>
+          <a:bodyPr rtlCol="0" anchor="ctr"/>
+          <a:lstStyle/>
+          <a:p>
+            <a:pPr algn="ctr"/>
+            <a:endParaRPr lang="zh-CN" altLang="en-US"/>
+          </a:p>
+        </p:txBody>
+      </p:sp>
+      <p:sp>
+        <p:nvSpPr>
+          <p:cNvPr id="23" name="TextBox 22">
+            <a:extLst>
+              <a:ext uri="{FF2B5EF4-FFF2-40B4-BE49-F238E27FC236}">
+                <a16:creationId xmlns:a16="http://schemas.microsoft.com/office/drawing/2014/main" id="{0B7CB43D-57F4-4599-9326-9403BFF82C82}"/>
+              </a:ext>
+            </a:extLst>
+          </p:cNvPr>
+          <p:cNvSpPr txBox="1"/>
+          <p:nvPr/>
+        </p:nvSpPr>
+        <p:spPr>
+          <a:xfrm>
+            <a:off x="4806361" y="3677615"/>
+            <a:ext cx="2636886" cy="1077218"/>
+          </a:xfrm>
+          <a:prstGeom prst="rect">
+            <a:avLst/>
+          </a:prstGeom>
+          <a:noFill/>
+        </p:spPr>
+        <p:txBody>
+          <a:bodyPr wrap="square" rtlCol="0">
+            <a:spAutoFit/>
+          </a:bodyPr>
+          <a:lstStyle/>
+          <a:p>
+            <a:pPr algn="ctr"/>
+            <a:r>
+              <a:rPr lang="zh-CN" altLang="en-US" sz="2400" dirty="0">
+                <a:solidFill>
+                  <a:srgbClr val="0070C0"/>
+                </a:solidFill>
+              </a:rPr>
+              <a:t>生成分析报告按钮</a:t>
+            </a:r>
+            <a:endParaRPr lang="en-US" altLang="zh-CN" sz="2400" dirty="0">
+              <a:solidFill>
+                <a:srgbClr val="0070C0"/>
+              </a:solidFill>
+            </a:endParaRPr>
+          </a:p>
+          <a:p>
+            <a:pPr algn="ctr"/>
+            <a:r>
+              <a:rPr lang="en-US" altLang="zh-CN" sz="2000" dirty="0">
+                <a:solidFill>
+                  <a:schemeClr val="tx1">
+                    <a:lumMod val="50000"/>
+                    <a:lumOff val="50000"/>
+                  </a:schemeClr>
+                </a:solidFill>
+              </a:rPr>
+              <a:t>(</a:t>
+            </a:r>
+            <a:r>
+              <a:rPr lang="zh-CN" altLang="en-US" sz="2000" dirty="0">
+                <a:solidFill>
+                  <a:schemeClr val="tx1">
+                    <a:lumMod val="50000"/>
+                    <a:lumOff val="50000"/>
+                  </a:schemeClr>
+                </a:solidFill>
+              </a:rPr>
+              <a:t>自动生成分析报告，</a:t>
+            </a:r>
+            <a:br>
+              <a:rPr lang="en-US" altLang="zh-CN" sz="2000" dirty="0">
+                <a:solidFill>
+                  <a:schemeClr val="tx1">
+                    <a:lumMod val="50000"/>
+                    <a:lumOff val="50000"/>
+                  </a:schemeClr>
+                </a:solidFill>
+              </a:rPr>
+            </a:br>
+            <a:r>
+              <a:rPr lang="zh-CN" altLang="en-US" sz="2000" dirty="0">
+                <a:solidFill>
+                  <a:schemeClr val="tx1">
+                    <a:lumMod val="50000"/>
+                    <a:lumOff val="50000"/>
+                  </a:schemeClr>
+                </a:solidFill>
+              </a:rPr>
+              <a:t>如右图所示</a:t>
+            </a:r>
+            <a:r>
+              <a:rPr lang="en-US" altLang="zh-CN" sz="2000" dirty="0">
+                <a:solidFill>
+                  <a:schemeClr val="tx1">
+                    <a:lumMod val="50000"/>
+                    <a:lumOff val="50000"/>
+                  </a:schemeClr>
+                </a:solidFill>
+              </a:rPr>
+              <a:t>)</a:t>
+            </a:r>
+            <a:endParaRPr lang="zh-CN" altLang="en-US" sz="2000" dirty="0">
+              <a:solidFill>
+                <a:schemeClr val="tx1">
+                  <a:lumMod val="50000"/>
+                  <a:lumOff val="50000"/>
+                </a:schemeClr>
+              </a:solidFill>
+            </a:endParaRPr>
+          </a:p>
+        </p:txBody>
+      </p:sp>
+      <p:cxnSp>
+        <p:nvCxnSpPr>
+          <p:cNvPr id="25" name="Straight Arrow Connector 24">
+            <a:extLst>
+              <a:ext uri="{FF2B5EF4-FFF2-40B4-BE49-F238E27FC236}">
+                <a16:creationId xmlns:a16="http://schemas.microsoft.com/office/drawing/2014/main" id="{B3C903FC-A472-40CE-8F85-2F5911576C32}"/>
+              </a:ext>
+            </a:extLst>
+          </p:cNvPr>
+          <p:cNvCxnSpPr>
+            <a:cxnSpLocks/>
+            <a:stCxn id="23" idx="1"/>
+            <a:endCxn id="20" idx="3"/>
+          </p:cNvCxnSpPr>
+          <p:nvPr/>
+        </p:nvCxnSpPr>
+        <p:spPr>
+          <a:xfrm flipH="1" flipV="1">
+            <a:off x="4073235" y="4214738"/>
+            <a:ext cx="733126" cy="1486"/>
+          </a:xfrm>
+          <a:prstGeom prst="straightConnector1">
+            <a:avLst/>
+          </a:prstGeom>
+          <a:ln w="57150">
+            <a:solidFill>
+              <a:srgbClr val="0070C0"/>
+            </a:solidFill>
+            <a:tailEnd type="triangle" w="lg" len="lg"/>
+          </a:ln>
+        </p:spPr>
+        <p:style>
+          <a:lnRef idx="1">
+            <a:schemeClr val="accent1"/>
+          </a:lnRef>
+          <a:fillRef idx="0">
+            <a:schemeClr val="accent1"/>
+          </a:fillRef>
+          <a:effectRef idx="0">
+            <a:schemeClr val="accent1"/>
+          </a:effectRef>
+          <a:fontRef idx="minor">
+            <a:schemeClr val="tx1"/>
+          </a:fontRef>
+        </p:style>
+      </p:cxnSp>
+      <p:pic>
+        <p:nvPicPr>
+          <p:cNvPr id="26" name="Picture 25">
+            <a:extLst>
+              <a:ext uri="{FF2B5EF4-FFF2-40B4-BE49-F238E27FC236}">
+                <a16:creationId xmlns:a16="http://schemas.microsoft.com/office/drawing/2014/main" id="{58636C54-2460-4607-9017-173CB8F35F7F}"/>
+              </a:ext>
+            </a:extLst>
+          </p:cNvPr>
+          <p:cNvPicPr>
+            <a:picLocks noChangeAspect="1"/>
+          </p:cNvPicPr>
+          <p:nvPr/>
+        </p:nvPicPr>
+        <p:blipFill>
+          <a:blip r:embed="rId3"/>
+          <a:stretch>
+            <a:fillRect/>
+          </a:stretch>
+        </p:blipFill>
+        <p:spPr>
+          <a:xfrm>
+            <a:off x="7706485" y="540327"/>
+            <a:ext cx="3708282" cy="6082145"/>
+          </a:xfrm>
+          <a:prstGeom prst="rect">
+            <a:avLst/>
+          </a:prstGeom>
+        </p:spPr>
+      </p:pic>
+      <p:sp>
+        <p:nvSpPr>
+          <p:cNvPr id="27" name="TextBox 26">
+            <a:extLst>
+              <a:ext uri="{FF2B5EF4-FFF2-40B4-BE49-F238E27FC236}">
+                <a16:creationId xmlns:a16="http://schemas.microsoft.com/office/drawing/2014/main" id="{D3B85433-DAF3-4B7A-8677-168C6981DC2A}"/>
+              </a:ext>
+            </a:extLst>
+          </p:cNvPr>
+          <p:cNvSpPr txBox="1"/>
+          <p:nvPr/>
+        </p:nvSpPr>
+        <p:spPr>
+          <a:xfrm rot="20034436">
+            <a:off x="10551869" y="685736"/>
+            <a:ext cx="1458140" cy="461665"/>
+          </a:xfrm>
+          <a:prstGeom prst="rect">
+            <a:avLst/>
+          </a:prstGeom>
+          <a:noFill/>
+        </p:spPr>
+        <p:txBody>
+          <a:bodyPr wrap="square" rtlCol="0">
+            <a:spAutoFit/>
+          </a:bodyPr>
+          <a:lstStyle/>
+          <a:p>
+            <a:pPr algn="ctr"/>
+            <a:r>
+              <a:rPr lang="zh-CN" altLang="en-US" sz="2400" b="1" dirty="0">
+                <a:solidFill>
+                  <a:srgbClr val="FF0000"/>
+                </a:solidFill>
+              </a:rPr>
+              <a:t>被试信息</a:t>
+            </a:r>
+          </a:p>
+        </p:txBody>
+      </p:sp>
+      <p:sp>
+        <p:nvSpPr>
+          <p:cNvPr id="28" name="TextBox 27">
+            <a:extLst>
+              <a:ext uri="{FF2B5EF4-FFF2-40B4-BE49-F238E27FC236}">
+                <a16:creationId xmlns:a16="http://schemas.microsoft.com/office/drawing/2014/main" id="{528ABCB1-053E-4644-96F6-D340C712362A}"/>
+              </a:ext>
+            </a:extLst>
+          </p:cNvPr>
+          <p:cNvSpPr txBox="1"/>
+          <p:nvPr/>
+        </p:nvSpPr>
+        <p:spPr>
+          <a:xfrm rot="20034436">
+            <a:off x="10685698" y="1741677"/>
+            <a:ext cx="1458140" cy="461665"/>
+          </a:xfrm>
+          <a:prstGeom prst="rect">
+            <a:avLst/>
+          </a:prstGeom>
+          <a:noFill/>
+        </p:spPr>
+        <p:txBody>
+          <a:bodyPr wrap="square" rtlCol="0">
+            <a:spAutoFit/>
+          </a:bodyPr>
+          <a:lstStyle/>
+          <a:p>
+            <a:pPr algn="ctr"/>
+            <a:r>
+              <a:rPr lang="zh-CN" altLang="en-US" sz="2400" b="1" dirty="0">
+                <a:solidFill>
+                  <a:srgbClr val="FF0000"/>
+                </a:solidFill>
+              </a:rPr>
+              <a:t>结果概述</a:t>
+            </a:r>
+          </a:p>
+        </p:txBody>
+      </p:sp>
+      <p:sp>
+        <p:nvSpPr>
+          <p:cNvPr id="32" name="TextBox 31">
+            <a:extLst>
+              <a:ext uri="{FF2B5EF4-FFF2-40B4-BE49-F238E27FC236}">
+                <a16:creationId xmlns:a16="http://schemas.microsoft.com/office/drawing/2014/main" id="{59674896-08BE-4248-A0E0-AA29A26E3B53}"/>
+              </a:ext>
+            </a:extLst>
+          </p:cNvPr>
+          <p:cNvSpPr txBox="1"/>
+          <p:nvPr/>
+        </p:nvSpPr>
+        <p:spPr>
+          <a:xfrm rot="20034436">
+            <a:off x="10592055" y="3983905"/>
+            <a:ext cx="1458140" cy="461665"/>
+          </a:xfrm>
+          <a:prstGeom prst="rect">
+            <a:avLst/>
+          </a:prstGeom>
+          <a:noFill/>
+        </p:spPr>
+        <p:txBody>
+          <a:bodyPr wrap="square" rtlCol="0">
+            <a:spAutoFit/>
+          </a:bodyPr>
+          <a:lstStyle/>
+          <a:p>
+            <a:pPr algn="ctr"/>
+            <a:r>
+              <a:rPr lang="zh-CN" altLang="en-US" sz="2400" b="1" dirty="0">
+                <a:solidFill>
+                  <a:srgbClr val="FF0000"/>
+                </a:solidFill>
+              </a:rPr>
+              <a:t>分析截图</a:t>
+            </a:r>
+          </a:p>
+        </p:txBody>
+      </p:sp>
+      <p:sp>
+        <p:nvSpPr>
+          <p:cNvPr id="33" name="TextBox 32">
+            <a:extLst>
+              <a:ext uri="{FF2B5EF4-FFF2-40B4-BE49-F238E27FC236}">
+                <a16:creationId xmlns:a16="http://schemas.microsoft.com/office/drawing/2014/main" id="{D3879DEC-F124-41A0-942B-3C29C621AA82}"/>
+              </a:ext>
+            </a:extLst>
+          </p:cNvPr>
+          <p:cNvSpPr txBox="1"/>
+          <p:nvPr/>
+        </p:nvSpPr>
+        <p:spPr>
+          <a:xfrm>
+            <a:off x="8456448" y="5356284"/>
+            <a:ext cx="2643145" cy="461665"/>
+          </a:xfrm>
+          <a:prstGeom prst="rect">
+            <a:avLst/>
+          </a:prstGeom>
+          <a:noFill/>
+        </p:spPr>
+        <p:txBody>
+          <a:bodyPr wrap="square" rtlCol="0">
+            <a:spAutoFit/>
+          </a:bodyPr>
+          <a:lstStyle/>
+          <a:p>
+            <a:pPr algn="ctr"/>
+            <a:r>
+              <a:rPr lang="zh-CN" altLang="en-US" sz="2400" b="1" dirty="0">
+                <a:solidFill>
+                  <a:srgbClr val="FF0000"/>
+                </a:solidFill>
+              </a:rPr>
+              <a:t>其他须说明的情况</a:t>
+            </a:r>
+          </a:p>
+        </p:txBody>
+      </p:sp>
+      <p:sp>
+        <p:nvSpPr>
+          <p:cNvPr id="34" name="TextBox 33">
+            <a:extLst>
+              <a:ext uri="{FF2B5EF4-FFF2-40B4-BE49-F238E27FC236}">
+                <a16:creationId xmlns:a16="http://schemas.microsoft.com/office/drawing/2014/main" id="{E803B2C2-C1DE-4D6F-B460-ABA151D8786E}"/>
+              </a:ext>
+            </a:extLst>
+          </p:cNvPr>
+          <p:cNvSpPr txBox="1"/>
+          <p:nvPr/>
+        </p:nvSpPr>
+        <p:spPr>
+          <a:xfrm>
+            <a:off x="8217936" y="5947942"/>
+            <a:ext cx="1458140" cy="461665"/>
+          </a:xfrm>
+          <a:prstGeom prst="rect">
+            <a:avLst/>
+          </a:prstGeom>
+          <a:noFill/>
+        </p:spPr>
+        <p:txBody>
+          <a:bodyPr wrap="square" rtlCol="0">
+            <a:spAutoFit/>
+          </a:bodyPr>
+          <a:lstStyle/>
+          <a:p>
+            <a:pPr algn="ctr"/>
+            <a:r>
+              <a:rPr lang="zh-CN" altLang="en-US" sz="2400" b="1" dirty="0">
+                <a:solidFill>
+                  <a:srgbClr val="FF0000"/>
+                </a:solidFill>
+              </a:rPr>
+              <a:t>签字留档</a:t>
+            </a:r>
+          </a:p>
+        </p:txBody>
+      </p:sp>
+      <p:sp>
+        <p:nvSpPr>
+          <p:cNvPr id="35" name="TextBox 34">
+            <a:extLst>
+              <a:ext uri="{FF2B5EF4-FFF2-40B4-BE49-F238E27FC236}">
+                <a16:creationId xmlns:a16="http://schemas.microsoft.com/office/drawing/2014/main" id="{0FAD39D5-7F01-4569-982E-4C0EE2072DA0}"/>
+              </a:ext>
+            </a:extLst>
+          </p:cNvPr>
+          <p:cNvSpPr txBox="1"/>
+          <p:nvPr/>
+        </p:nvSpPr>
+        <p:spPr>
+          <a:xfrm>
+            <a:off x="9676076" y="6539600"/>
+            <a:ext cx="2494984" cy="338554"/>
+          </a:xfrm>
+          <a:prstGeom prst="rect">
+            <a:avLst/>
+          </a:prstGeom>
+          <a:noFill/>
+        </p:spPr>
+        <p:txBody>
+          <a:bodyPr wrap="square" rtlCol="0">
+            <a:spAutoFit/>
+          </a:bodyPr>
+          <a:lstStyle/>
+          <a:p>
+            <a:pPr algn="ctr"/>
+            <a:r>
+              <a:rPr lang="zh-CN" altLang="en-US" sz="1600" dirty="0">
+                <a:solidFill>
+                  <a:srgbClr val="FF0000"/>
+                </a:solidFill>
+              </a:rPr>
+              <a:t>此次分析的唯一识别编号</a:t>
+            </a:r>
+          </a:p>
+        </p:txBody>
+      </p:sp>
+    </p:spTree>
+    <p:extLst>
+      <p:ext uri="{BB962C8B-B14F-4D97-AF65-F5344CB8AC3E}">
+        <p14:creationId xmlns:p14="http://schemas.microsoft.com/office/powerpoint/2010/main" val="3912698762"/>
       </p:ext>
     </p:extLst>
   </p:cSld>

</xml_diff>

<commit_message>
v40, first customer review
</commit_message>
<xml_diff>
--- a/gui/manual/manual.pptx
+++ b/gui/manual/manual.pptx
@@ -5,13 +5,14 @@
     <p:sldMasterId id="2147483648" r:id="rId1"/>
   </p:sldMasterIdLst>
   <p:sldIdLst>
-    <p:sldId id="262" r:id="rId2"/>
-    <p:sldId id="257" r:id="rId3"/>
-    <p:sldId id="259" r:id="rId4"/>
-    <p:sldId id="260" r:id="rId5"/>
-    <p:sldId id="261" r:id="rId6"/>
-    <p:sldId id="265" r:id="rId7"/>
-    <p:sldId id="263" r:id="rId8"/>
+    <p:sldId id="266" r:id="rId2"/>
+    <p:sldId id="262" r:id="rId3"/>
+    <p:sldId id="257" r:id="rId4"/>
+    <p:sldId id="259" r:id="rId5"/>
+    <p:sldId id="260" r:id="rId6"/>
+    <p:sldId id="261" r:id="rId7"/>
+    <p:sldId id="265" r:id="rId8"/>
+    <p:sldId id="263" r:id="rId9"/>
   </p:sldIdLst>
   <p:sldSz cx="12192000" cy="6858000"/>
   <p:notesSz cx="6858000" cy="9144000"/>
@@ -4346,7 +4347,7 @@
           <a:p>
             <a:fld id="{DA207E81-3FC7-4CE2-8E9A-33FCAA24BF42}" type="datetimeFigureOut">
               <a:rPr lang="zh-CN" altLang="en-US" smtClean="0"/>
-              <a:t>2018/12/5</a:t>
+              <a:t>2019/1/7</a:t>
             </a:fld>
             <a:endParaRPr lang="zh-CN" altLang="en-US"/>
           </a:p>
@@ -4546,7 +4547,7 @@
           <a:p>
             <a:fld id="{DA207E81-3FC7-4CE2-8E9A-33FCAA24BF42}" type="datetimeFigureOut">
               <a:rPr lang="zh-CN" altLang="en-US" smtClean="0"/>
-              <a:t>2018/12/5</a:t>
+              <a:t>2019/1/7</a:t>
             </a:fld>
             <a:endParaRPr lang="zh-CN" altLang="en-US"/>
           </a:p>
@@ -4756,7 +4757,7 @@
           <a:p>
             <a:fld id="{DA207E81-3FC7-4CE2-8E9A-33FCAA24BF42}" type="datetimeFigureOut">
               <a:rPr lang="zh-CN" altLang="en-US" smtClean="0"/>
-              <a:t>2018/12/5</a:t>
+              <a:t>2019/1/7</a:t>
             </a:fld>
             <a:endParaRPr lang="zh-CN" altLang="en-US"/>
           </a:p>
@@ -4956,7 +4957,7 @@
           <a:p>
             <a:fld id="{DA207E81-3FC7-4CE2-8E9A-33FCAA24BF42}" type="datetimeFigureOut">
               <a:rPr lang="zh-CN" altLang="en-US" smtClean="0"/>
-              <a:t>2018/12/5</a:t>
+              <a:t>2019/1/7</a:t>
             </a:fld>
             <a:endParaRPr lang="zh-CN" altLang="en-US"/>
           </a:p>
@@ -5232,7 +5233,7 @@
           <a:p>
             <a:fld id="{DA207E81-3FC7-4CE2-8E9A-33FCAA24BF42}" type="datetimeFigureOut">
               <a:rPr lang="zh-CN" altLang="en-US" smtClean="0"/>
-              <a:t>2018/12/5</a:t>
+              <a:t>2019/1/7</a:t>
             </a:fld>
             <a:endParaRPr lang="zh-CN" altLang="en-US"/>
           </a:p>
@@ -5500,7 +5501,7 @@
           <a:p>
             <a:fld id="{DA207E81-3FC7-4CE2-8E9A-33FCAA24BF42}" type="datetimeFigureOut">
               <a:rPr lang="zh-CN" altLang="en-US" smtClean="0"/>
-              <a:t>2018/12/5</a:t>
+              <a:t>2019/1/7</a:t>
             </a:fld>
             <a:endParaRPr lang="zh-CN" altLang="en-US"/>
           </a:p>
@@ -5915,7 +5916,7 @@
           <a:p>
             <a:fld id="{DA207E81-3FC7-4CE2-8E9A-33FCAA24BF42}" type="datetimeFigureOut">
               <a:rPr lang="zh-CN" altLang="en-US" smtClean="0"/>
-              <a:t>2018/12/5</a:t>
+              <a:t>2019/1/7</a:t>
             </a:fld>
             <a:endParaRPr lang="zh-CN" altLang="en-US"/>
           </a:p>
@@ -6057,7 +6058,7 @@
           <a:p>
             <a:fld id="{DA207E81-3FC7-4CE2-8E9A-33FCAA24BF42}" type="datetimeFigureOut">
               <a:rPr lang="zh-CN" altLang="en-US" smtClean="0"/>
-              <a:t>2018/12/5</a:t>
+              <a:t>2019/1/7</a:t>
             </a:fld>
             <a:endParaRPr lang="zh-CN" altLang="en-US"/>
           </a:p>
@@ -6170,7 +6171,7 @@
           <a:p>
             <a:fld id="{DA207E81-3FC7-4CE2-8E9A-33FCAA24BF42}" type="datetimeFigureOut">
               <a:rPr lang="zh-CN" altLang="en-US" smtClean="0"/>
-              <a:t>2018/12/5</a:t>
+              <a:t>2019/1/7</a:t>
             </a:fld>
             <a:endParaRPr lang="zh-CN" altLang="en-US"/>
           </a:p>
@@ -6483,7 +6484,7 @@
           <a:p>
             <a:fld id="{DA207E81-3FC7-4CE2-8E9A-33FCAA24BF42}" type="datetimeFigureOut">
               <a:rPr lang="zh-CN" altLang="en-US" smtClean="0"/>
-              <a:t>2018/12/5</a:t>
+              <a:t>2019/1/7</a:t>
             </a:fld>
             <a:endParaRPr lang="zh-CN" altLang="en-US"/>
           </a:p>
@@ -6772,7 +6773,7 @@
           <a:p>
             <a:fld id="{DA207E81-3FC7-4CE2-8E9A-33FCAA24BF42}" type="datetimeFigureOut">
               <a:rPr lang="zh-CN" altLang="en-US" smtClean="0"/>
-              <a:t>2018/12/5</a:t>
+              <a:t>2019/1/7</a:t>
             </a:fld>
             <a:endParaRPr lang="zh-CN" altLang="en-US"/>
           </a:p>
@@ -7015,7 +7016,7 @@
           <a:p>
             <a:fld id="{DA207E81-3FC7-4CE2-8E9A-33FCAA24BF42}" type="datetimeFigureOut">
               <a:rPr lang="zh-CN" altLang="en-US" smtClean="0"/>
-              <a:t>2018/12/5</a:t>
+              <a:t>2019/1/7</a:t>
             </a:fld>
             <a:endParaRPr lang="zh-CN" altLang="en-US"/>
           </a:p>
@@ -7432,6 +7433,154 @@
           <a:chExt cx="0" cy="0"/>
         </a:xfrm>
       </p:grpSpPr>
+      <p:sp>
+        <p:nvSpPr>
+          <p:cNvPr id="4" name="Title 3">
+            <a:extLst>
+              <a:ext uri="{FF2B5EF4-FFF2-40B4-BE49-F238E27FC236}">
+                <a16:creationId xmlns:a16="http://schemas.microsoft.com/office/drawing/2014/main" id="{ADF81388-27BC-450D-9003-E1BA57C68DCA}"/>
+              </a:ext>
+            </a:extLst>
+          </p:cNvPr>
+          <p:cNvSpPr>
+            <a:spLocks noGrp="1"/>
+          </p:cNvSpPr>
+          <p:nvPr>
+            <p:ph type="ctrTitle"/>
+          </p:nvPr>
+        </p:nvSpPr>
+        <p:spPr/>
+        <p:txBody>
+          <a:bodyPr/>
+          <a:lstStyle/>
+          <a:p>
+            <a:r>
+              <a:rPr lang="en-US" altLang="zh-CN" dirty="0" err="1"/>
+              <a:t>TMSLocation.m</a:t>
+            </a:r>
+            <a:r>
+              <a:rPr lang="zh-CN" altLang="en-US" dirty="0"/>
+              <a:t>为程序入口</a:t>
+            </a:r>
+          </a:p>
+        </p:txBody>
+      </p:sp>
+      <p:sp>
+        <p:nvSpPr>
+          <p:cNvPr id="5" name="Subtitle 4">
+            <a:extLst>
+              <a:ext uri="{FF2B5EF4-FFF2-40B4-BE49-F238E27FC236}">
+                <a16:creationId xmlns:a16="http://schemas.microsoft.com/office/drawing/2014/main" id="{884B0D23-AD08-4323-B392-9E453A2958BA}"/>
+              </a:ext>
+            </a:extLst>
+          </p:cNvPr>
+          <p:cNvSpPr>
+            <a:spLocks noGrp="1"/>
+          </p:cNvSpPr>
+          <p:nvPr>
+            <p:ph type="subTitle" idx="1"/>
+          </p:nvPr>
+        </p:nvSpPr>
+        <p:spPr/>
+        <p:txBody>
+          <a:bodyPr/>
+          <a:lstStyle/>
+          <a:p>
+            <a:pPr marL="342900" indent="-342900" algn="l">
+              <a:buFont typeface="Arial" panose="020B0604020202020204" pitchFamily="34" charset="0"/>
+              <a:buChar char="•"/>
+            </a:pPr>
+            <a:endParaRPr lang="en-US" altLang="zh-CN" dirty="0"/>
+          </a:p>
+          <a:p>
+            <a:pPr marL="342900" indent="-342900" algn="l">
+              <a:buFont typeface="Arial" panose="020B0604020202020204" pitchFamily="34" charset="0"/>
+              <a:buChar char="•"/>
+            </a:pPr>
+            <a:r>
+              <a:rPr lang="zh-CN" altLang="en-US" dirty="0"/>
+              <a:t>请将其所在目录加入到</a:t>
+            </a:r>
+            <a:r>
+              <a:rPr lang="en-US" altLang="zh-CN" dirty="0"/>
+              <a:t>MATLAB</a:t>
+            </a:r>
+            <a:r>
+              <a:rPr lang="zh-CN" altLang="en-US" dirty="0"/>
+              <a:t>的工作目录</a:t>
+            </a:r>
+            <a:endParaRPr lang="en-US" altLang="zh-CN" dirty="0"/>
+          </a:p>
+          <a:p>
+            <a:pPr marL="342900" indent="-342900" algn="l">
+              <a:buFont typeface="Arial" panose="020B0604020202020204" pitchFamily="34" charset="0"/>
+              <a:buChar char="•"/>
+            </a:pPr>
+            <a:r>
+              <a:rPr lang="zh-CN" altLang="en-US" dirty="0"/>
+              <a:t>在</a:t>
+            </a:r>
+            <a:r>
+              <a:rPr lang="en-US" altLang="zh-CN" dirty="0"/>
+              <a:t>MATLAB</a:t>
+            </a:r>
+            <a:r>
+              <a:rPr lang="zh-CN" altLang="en-US" dirty="0"/>
+              <a:t>的</a:t>
+            </a:r>
+            <a:r>
+              <a:rPr lang="en-US" altLang="zh-CN" dirty="0"/>
+              <a:t>command</a:t>
+            </a:r>
+            <a:r>
+              <a:rPr lang="zh-CN" altLang="en-US" dirty="0"/>
+              <a:t>界面输入 </a:t>
+            </a:r>
+            <a:r>
+              <a:rPr lang="en-US" altLang="zh-CN" dirty="0" err="1"/>
+              <a:t>TMSLocation</a:t>
+            </a:r>
+            <a:r>
+              <a:rPr lang="en-US" altLang="zh-CN" dirty="0"/>
+              <a:t> </a:t>
+            </a:r>
+            <a:r>
+              <a:rPr lang="zh-CN" altLang="en-US" dirty="0"/>
+              <a:t>即可启动程序</a:t>
+            </a:r>
+          </a:p>
+        </p:txBody>
+      </p:sp>
+    </p:spTree>
+    <p:extLst>
+      <p:ext uri="{BB962C8B-B14F-4D97-AF65-F5344CB8AC3E}">
+        <p14:creationId xmlns:p14="http://schemas.microsoft.com/office/powerpoint/2010/main" val="626849377"/>
+      </p:ext>
+    </p:extLst>
+  </p:cSld>
+  <p:clrMapOvr>
+    <a:masterClrMapping/>
+  </p:clrMapOvr>
+</p:sld>
+</file>
+
+<file path=ppt/slides/slide2.xml><?xml version="1.0" encoding="utf-8"?>
+<p:sld xmlns:a="http://schemas.openxmlformats.org/drawingml/2006/main" xmlns:r="http://schemas.openxmlformats.org/officeDocument/2006/relationships" xmlns:p="http://schemas.openxmlformats.org/presentationml/2006/main">
+  <p:cSld>
+    <p:spTree>
+      <p:nvGrpSpPr>
+        <p:cNvPr id="1" name=""/>
+        <p:cNvGrpSpPr/>
+        <p:nvPr/>
+      </p:nvGrpSpPr>
+      <p:grpSpPr>
+        <a:xfrm>
+          <a:off x="0" y="0"/>
+          <a:ext cx="0" cy="0"/>
+          <a:chOff x="0" y="0"/>
+          <a:chExt cx="0" cy="0"/>
+        </a:xfrm>
+      </p:grpSpPr>
       <p:graphicFrame>
         <p:nvGraphicFramePr>
           <p:cNvPr id="4" name="Diagram 3">
@@ -7545,7 +7694,7 @@
 </p:sld>
 </file>
 
-<file path=ppt/slides/slide2.xml><?xml version="1.0" encoding="utf-8"?>
+<file path=ppt/slides/slide3.xml><?xml version="1.0" encoding="utf-8"?>
 <p:sld xmlns:a="http://schemas.openxmlformats.org/drawingml/2006/main" xmlns:r="http://schemas.openxmlformats.org/officeDocument/2006/relationships" xmlns:p="http://schemas.openxmlformats.org/presentationml/2006/main">
   <p:cSld>
     <p:spTree>
@@ -7919,7 +8068,7 @@
 </p:sld>
 </file>
 
-<file path=ppt/slides/slide3.xml><?xml version="1.0" encoding="utf-8"?>
+<file path=ppt/slides/slide4.xml><?xml version="1.0" encoding="utf-8"?>
 <p:sld xmlns:a="http://schemas.openxmlformats.org/drawingml/2006/main" xmlns:r="http://schemas.openxmlformats.org/officeDocument/2006/relationships" xmlns:p="http://schemas.openxmlformats.org/presentationml/2006/main">
   <p:cSld>
     <p:spTree>
@@ -8604,7 +8753,7 @@
 </p:sld>
 </file>
 
-<file path=ppt/slides/slide4.xml><?xml version="1.0" encoding="utf-8"?>
+<file path=ppt/slides/slide5.xml><?xml version="1.0" encoding="utf-8"?>
 <p:sld xmlns:a="http://schemas.openxmlformats.org/drawingml/2006/main" xmlns:r="http://schemas.openxmlformats.org/officeDocument/2006/relationships" xmlns:p="http://schemas.openxmlformats.org/presentationml/2006/main">
   <p:cSld>
     <p:spTree>
@@ -9481,7 +9630,7 @@
 </p:sld>
 </file>
 
-<file path=ppt/slides/slide5.xml><?xml version="1.0" encoding="utf-8"?>
+<file path=ppt/slides/slide6.xml><?xml version="1.0" encoding="utf-8"?>
 <p:sld xmlns:a="http://schemas.openxmlformats.org/drawingml/2006/main" xmlns:r="http://schemas.openxmlformats.org/officeDocument/2006/relationships" xmlns:p="http://schemas.openxmlformats.org/presentationml/2006/main">
   <p:cSld>
     <p:spTree>
@@ -10281,7 +10430,7 @@
 </p:sld>
 </file>
 
-<file path=ppt/slides/slide6.xml><?xml version="1.0" encoding="utf-8"?>
+<file path=ppt/slides/slide7.xml><?xml version="1.0" encoding="utf-8"?>
 <p:sld xmlns:a="http://schemas.openxmlformats.org/drawingml/2006/main" xmlns:r="http://schemas.openxmlformats.org/officeDocument/2006/relationships" xmlns:p="http://schemas.openxmlformats.org/presentationml/2006/main">
   <p:cSld>
     <p:spTree>
@@ -10704,7 +10853,7 @@
 </p:sld>
 </file>
 
-<file path=ppt/slides/slide7.xml><?xml version="1.0" encoding="utf-8"?>
+<file path=ppt/slides/slide8.xml><?xml version="1.0" encoding="utf-8"?>
 <p:sld xmlns:a="http://schemas.openxmlformats.org/drawingml/2006/main" xmlns:r="http://schemas.openxmlformats.org/officeDocument/2006/relationships" xmlns:p="http://schemas.openxmlformats.org/presentationml/2006/main">
   <p:cSld>
     <p:spTree>

</xml_diff>